<commit_message>
Update intro and overview
</commit_message>
<xml_diff>
--- a/cits1003-lecture_slides/CITX1003-0 Overview.pptx
+++ b/cits1003-lecture_slides/CITX1003-0 Overview.pptx
@@ -5,7 +5,7 @@
     <p:sldMasterId id="2147483763" r:id="rId1"/>
   </p:sldMasterIdLst>
   <p:notesMasterIdLst>
-    <p:notesMasterId r:id="rId31"/>
+    <p:notesMasterId r:id="rId30"/>
   </p:notesMasterIdLst>
   <p:sldIdLst>
     <p:sldId id="256" r:id="rId2"/>
@@ -27,16 +27,15 @@
     <p:sldId id="274" r:id="rId18"/>
     <p:sldId id="272" r:id="rId19"/>
     <p:sldId id="323" r:id="rId20"/>
-    <p:sldId id="544" r:id="rId21"/>
-    <p:sldId id="342" r:id="rId22"/>
-    <p:sldId id="269" r:id="rId23"/>
-    <p:sldId id="258" r:id="rId24"/>
-    <p:sldId id="266" r:id="rId25"/>
-    <p:sldId id="267" r:id="rId26"/>
-    <p:sldId id="268" r:id="rId27"/>
-    <p:sldId id="270" r:id="rId28"/>
-    <p:sldId id="275" r:id="rId29"/>
-    <p:sldId id="333" r:id="rId30"/>
+    <p:sldId id="342" r:id="rId21"/>
+    <p:sldId id="269" r:id="rId22"/>
+    <p:sldId id="258" r:id="rId23"/>
+    <p:sldId id="266" r:id="rId24"/>
+    <p:sldId id="267" r:id="rId25"/>
+    <p:sldId id="268" r:id="rId26"/>
+    <p:sldId id="270" r:id="rId27"/>
+    <p:sldId id="275" r:id="rId28"/>
+    <p:sldId id="333" r:id="rId29"/>
   </p:sldIdLst>
   <p:sldSz cx="12192000" cy="6858000"/>
   <p:notesSz cx="6858000" cy="9144000"/>
@@ -1557,7 +1556,7 @@
   <pc:docChgLst>
     <pc:chgData name="Robert McKnight" userId="d5c7fb24-67df-49c0-a0e8-7fe946ae099c" providerId="ADAL" clId="{3964EDD2-B985-416D-A448-BB20F41230B9}"/>
     <pc:docChg chg="undo custSel addSld delSld modSld sldOrd">
-      <pc:chgData name="Robert McKnight" userId="d5c7fb24-67df-49c0-a0e8-7fe946ae099c" providerId="ADAL" clId="{3964EDD2-B985-416D-A448-BB20F41230B9}" dt="2024-02-12T03:11:02.729" v="3393" actId="20577"/>
+      <pc:chgData name="Robert McKnight" userId="d5c7fb24-67df-49c0-a0e8-7fe946ae099c" providerId="ADAL" clId="{3964EDD2-B985-416D-A448-BB20F41230B9}" dt="2024-02-13T04:45:01.580" v="3487" actId="47"/>
       <pc:docMkLst>
         <pc:docMk/>
       </pc:docMkLst>
@@ -1653,6 +1652,21 @@
           </ac:picMkLst>
         </pc:picChg>
       </pc:sldChg>
+      <pc:sldChg chg="modSp mod">
+        <pc:chgData name="Robert McKnight" userId="d5c7fb24-67df-49c0-a0e8-7fe946ae099c" providerId="ADAL" clId="{3964EDD2-B985-416D-A448-BB20F41230B9}" dt="2024-02-13T04:44:49.080" v="3486" actId="20577"/>
+        <pc:sldMkLst>
+          <pc:docMk/>
+          <pc:sldMk cId="182683393" sldId="272"/>
+        </pc:sldMkLst>
+        <pc:spChg chg="mod">
+          <ac:chgData name="Robert McKnight" userId="d5c7fb24-67df-49c0-a0e8-7fe946ae099c" providerId="ADAL" clId="{3964EDD2-B985-416D-A448-BB20F41230B9}" dt="2024-02-13T04:44:49.080" v="3486" actId="20577"/>
+          <ac:spMkLst>
+            <pc:docMk/>
+            <pc:sldMk cId="182683393" sldId="272"/>
+            <ac:spMk id="3" creationId="{13DB3674-2D4B-8645-8753-8E30E629B377}"/>
+          </ac:spMkLst>
+        </pc:spChg>
+      </pc:sldChg>
       <pc:sldChg chg="modSp mod ord modAnim">
         <pc:chgData name="Robert McKnight" userId="d5c7fb24-67df-49c0-a0e8-7fe946ae099c" providerId="ADAL" clId="{3964EDD2-B985-416D-A448-BB20F41230B9}" dt="2024-02-12T01:10:58.902" v="2142"/>
         <pc:sldMkLst>
@@ -1669,13 +1683,13 @@
         </pc:spChg>
       </pc:sldChg>
       <pc:sldChg chg="modSp mod">
-        <pc:chgData name="Robert McKnight" userId="d5c7fb24-67df-49c0-a0e8-7fe946ae099c" providerId="ADAL" clId="{3964EDD2-B985-416D-A448-BB20F41230B9}" dt="2024-02-12T01:39:42.781" v="2813" actId="20577"/>
+        <pc:chgData name="Robert McKnight" userId="d5c7fb24-67df-49c0-a0e8-7fe946ae099c" providerId="ADAL" clId="{3964EDD2-B985-416D-A448-BB20F41230B9}" dt="2024-02-13T04:41:57.686" v="3409" actId="20577"/>
         <pc:sldMkLst>
           <pc:docMk/>
           <pc:sldMk cId="1892611882" sldId="274"/>
         </pc:sldMkLst>
         <pc:spChg chg="mod">
-          <ac:chgData name="Robert McKnight" userId="d5c7fb24-67df-49c0-a0e8-7fe946ae099c" providerId="ADAL" clId="{3964EDD2-B985-416D-A448-BB20F41230B9}" dt="2024-02-12T01:39:42.781" v="2813" actId="20577"/>
+          <ac:chgData name="Robert McKnight" userId="d5c7fb24-67df-49c0-a0e8-7fe946ae099c" providerId="ADAL" clId="{3964EDD2-B985-416D-A448-BB20F41230B9}" dt="2024-02-13T04:41:57.686" v="3409" actId="20577"/>
           <ac:spMkLst>
             <pc:docMk/>
             <pc:sldMk cId="1892611882" sldId="274"/>
@@ -1919,6 +1933,21 @@
           </ac:spMkLst>
         </pc:spChg>
       </pc:sldChg>
+      <pc:sldChg chg="modSp mod">
+        <pc:chgData name="Robert McKnight" userId="d5c7fb24-67df-49c0-a0e8-7fe946ae099c" providerId="ADAL" clId="{3964EDD2-B985-416D-A448-BB20F41230B9}" dt="2024-02-12T05:59:22.568" v="3407" actId="20577"/>
+        <pc:sldMkLst>
+          <pc:docMk/>
+          <pc:sldMk cId="3788011539" sldId="540"/>
+        </pc:sldMkLst>
+        <pc:spChg chg="mod">
+          <ac:chgData name="Robert McKnight" userId="d5c7fb24-67df-49c0-a0e8-7fe946ae099c" providerId="ADAL" clId="{3964EDD2-B985-416D-A448-BB20F41230B9}" dt="2024-02-12T05:59:22.568" v="3407" actId="20577"/>
+          <ac:spMkLst>
+            <pc:docMk/>
+            <pc:sldMk cId="3788011539" sldId="540"/>
+            <ac:spMk id="2" creationId="{DDA4E7FC-13D5-D64F-970D-EE15EF0A474C}"/>
+          </ac:spMkLst>
+        </pc:spChg>
+      </pc:sldChg>
       <pc:sldChg chg="modSp del mod">
         <pc:chgData name="Robert McKnight" userId="d5c7fb24-67df-49c0-a0e8-7fe946ae099c" providerId="ADAL" clId="{3964EDD2-B985-416D-A448-BB20F41230B9}" dt="2024-02-12T01:40:58.599" v="2929" actId="47"/>
         <pc:sldMkLst>
@@ -1955,6 +1984,13 @@
             <ac:spMk id="3" creationId="{E7B058CF-1E66-48A8-A8EB-3BE7B8CF9E6A}"/>
           </ac:spMkLst>
         </pc:spChg>
+      </pc:sldChg>
+      <pc:sldChg chg="del">
+        <pc:chgData name="Robert McKnight" userId="d5c7fb24-67df-49c0-a0e8-7fe946ae099c" providerId="ADAL" clId="{3964EDD2-B985-416D-A448-BB20F41230B9}" dt="2024-02-13T04:45:01.580" v="3487" actId="47"/>
+        <pc:sldMkLst>
+          <pc:docMk/>
+          <pc:sldMk cId="1821654354" sldId="544"/>
+        </pc:sldMkLst>
       </pc:sldChg>
       <pc:sldChg chg="add">
         <pc:chgData name="Robert McKnight" userId="d5c7fb24-67df-49c0-a0e8-7fe946ae099c" providerId="ADAL" clId="{3964EDD2-B985-416D-A448-BB20F41230B9}" dt="2024-02-12T01:13:41.023" v="2506"/>
@@ -4950,7 +4986,7 @@
           <a:p>
             <a:fld id="{6D6D7260-B7E4-B548-BD1F-84ED14536037}" type="datetimeFigureOut">
               <a:rPr lang="en-AU" smtClean="0"/>
-              <a:t>12/02/2024</a:t>
+              <a:t>13/02/2024</a:t>
             </a:fld>
             <a:endParaRPr lang="en-AU"/>
           </a:p>
@@ -6338,6 +6374,23 @@
           <a:bodyPr/>
           <a:lstStyle/>
           <a:p>
+            <a:pPr marL="0" marR="0" lvl="0" indent="0" algn="l" defTabSz="914400" rtl="0" eaLnBrk="1" fontAlgn="auto" latinLnBrk="0" hangingPunct="1">
+              <a:lnSpc>
+                <a:spcPct val="100000"/>
+              </a:lnSpc>
+              <a:spcBef>
+                <a:spcPts val="0"/>
+              </a:spcBef>
+              <a:spcAft>
+                <a:spcPts val="0"/>
+              </a:spcAft>
+              <a:buClrTx/>
+              <a:buSzTx/>
+              <a:buFontTx/>
+              <a:buNone/>
+              <a:tabLst/>
+              <a:defRPr/>
+            </a:pPr>
             <a:endParaRPr lang="en-US" dirty="0"/>
           </a:p>
         </p:txBody>
@@ -6368,7 +6421,7 @@
     </p:spTree>
     <p:extLst>
       <p:ext uri="{BB962C8B-B14F-4D97-AF65-F5344CB8AC3E}">
-        <p14:creationId xmlns:p14="http://schemas.microsoft.com/office/powerpoint/2010/main" val="2071216049"/>
+        <p14:creationId xmlns:p14="http://schemas.microsoft.com/office/powerpoint/2010/main" val="1859652453"/>
       </p:ext>
     </p:extLst>
   </p:cSld>
@@ -6439,7 +6492,7 @@
               <a:tabLst/>
               <a:defRPr/>
             </a:pPr>
-            <a:endParaRPr lang="en-US" dirty="0"/>
+            <a:endParaRPr lang="en-AU" dirty="0"/>
           </a:p>
         </p:txBody>
       </p:sp>
@@ -6469,7 +6522,7 @@
     </p:spTree>
     <p:extLst>
       <p:ext uri="{BB962C8B-B14F-4D97-AF65-F5344CB8AC3E}">
-        <p14:creationId xmlns:p14="http://schemas.microsoft.com/office/powerpoint/2010/main" val="1859652453"/>
+        <p14:creationId xmlns:p14="http://schemas.microsoft.com/office/powerpoint/2010/main" val="4259394936"/>
       </p:ext>
     </p:extLst>
   </p:cSld>
@@ -6523,23 +6576,6 @@
           <a:bodyPr/>
           <a:lstStyle/>
           <a:p>
-            <a:pPr marL="0" marR="0" lvl="0" indent="0" algn="l" defTabSz="914400" rtl="0" eaLnBrk="1" fontAlgn="auto" latinLnBrk="0" hangingPunct="1">
-              <a:lnSpc>
-                <a:spcPct val="100000"/>
-              </a:lnSpc>
-              <a:spcBef>
-                <a:spcPts val="0"/>
-              </a:spcBef>
-              <a:spcAft>
-                <a:spcPts val="0"/>
-              </a:spcAft>
-              <a:buClrTx/>
-              <a:buSzTx/>
-              <a:buFontTx/>
-              <a:buNone/>
-              <a:tabLst/>
-              <a:defRPr/>
-            </a:pPr>
             <a:endParaRPr lang="en-AU" dirty="0"/>
           </a:p>
         </p:txBody>
@@ -6570,7 +6606,7 @@
     </p:spTree>
     <p:extLst>
       <p:ext uri="{BB962C8B-B14F-4D97-AF65-F5344CB8AC3E}">
-        <p14:creationId xmlns:p14="http://schemas.microsoft.com/office/powerpoint/2010/main" val="4259394936"/>
+        <p14:creationId xmlns:p14="http://schemas.microsoft.com/office/powerpoint/2010/main" val="3690808671"/>
       </p:ext>
     </p:extLst>
   </p:cSld>
@@ -6654,7 +6690,7 @@
     </p:spTree>
     <p:extLst>
       <p:ext uri="{BB962C8B-B14F-4D97-AF65-F5344CB8AC3E}">
-        <p14:creationId xmlns:p14="http://schemas.microsoft.com/office/powerpoint/2010/main" val="3690808671"/>
+        <p14:creationId xmlns:p14="http://schemas.microsoft.com/office/powerpoint/2010/main" val="1870405037"/>
       </p:ext>
     </p:extLst>
   </p:cSld>
@@ -6738,7 +6774,7 @@
     </p:spTree>
     <p:extLst>
       <p:ext uri="{BB962C8B-B14F-4D97-AF65-F5344CB8AC3E}">
-        <p14:creationId xmlns:p14="http://schemas.microsoft.com/office/powerpoint/2010/main" val="1870405037"/>
+        <p14:creationId xmlns:p14="http://schemas.microsoft.com/office/powerpoint/2010/main" val="828346842"/>
       </p:ext>
     </p:extLst>
   </p:cSld>
@@ -6822,7 +6858,7 @@
     </p:spTree>
     <p:extLst>
       <p:ext uri="{BB962C8B-B14F-4D97-AF65-F5344CB8AC3E}">
-        <p14:creationId xmlns:p14="http://schemas.microsoft.com/office/powerpoint/2010/main" val="828346842"/>
+        <p14:creationId xmlns:p14="http://schemas.microsoft.com/office/powerpoint/2010/main" val="1767535874"/>
       </p:ext>
     </p:extLst>
   </p:cSld>
@@ -6876,6 +6912,23 @@
           <a:bodyPr/>
           <a:lstStyle/>
           <a:p>
+            <a:pPr marL="0" marR="0" lvl="0" indent="0" algn="l" defTabSz="914400" rtl="0" eaLnBrk="1" fontAlgn="auto" latinLnBrk="0" hangingPunct="1">
+              <a:lnSpc>
+                <a:spcPct val="100000"/>
+              </a:lnSpc>
+              <a:spcBef>
+                <a:spcPts val="0"/>
+              </a:spcBef>
+              <a:spcAft>
+                <a:spcPts val="0"/>
+              </a:spcAft>
+              <a:buClrTx/>
+              <a:buSzTx/>
+              <a:buFontTx/>
+              <a:buNone/>
+              <a:tabLst/>
+              <a:defRPr/>
+            </a:pPr>
             <a:endParaRPr lang="en-AU" dirty="0"/>
           </a:p>
         </p:txBody>
@@ -6906,7 +6959,7 @@
     </p:spTree>
     <p:extLst>
       <p:ext uri="{BB962C8B-B14F-4D97-AF65-F5344CB8AC3E}">
-        <p14:creationId xmlns:p14="http://schemas.microsoft.com/office/powerpoint/2010/main" val="1767535874"/>
+        <p14:creationId xmlns:p14="http://schemas.microsoft.com/office/powerpoint/2010/main" val="2767470669"/>
       </p:ext>
     </p:extLst>
   </p:cSld>
@@ -6960,23 +7013,6 @@
           <a:bodyPr/>
           <a:lstStyle/>
           <a:p>
-            <a:pPr marL="0" marR="0" lvl="0" indent="0" algn="l" defTabSz="914400" rtl="0" eaLnBrk="1" fontAlgn="auto" latinLnBrk="0" hangingPunct="1">
-              <a:lnSpc>
-                <a:spcPct val="100000"/>
-              </a:lnSpc>
-              <a:spcBef>
-                <a:spcPts val="0"/>
-              </a:spcBef>
-              <a:spcAft>
-                <a:spcPts val="0"/>
-              </a:spcAft>
-              <a:buClrTx/>
-              <a:buSzTx/>
-              <a:buFontTx/>
-              <a:buNone/>
-              <a:tabLst/>
-              <a:defRPr/>
-            </a:pPr>
             <a:endParaRPr lang="en-AU" dirty="0"/>
           </a:p>
         </p:txBody>
@@ -7007,7 +7043,7 @@
     </p:spTree>
     <p:extLst>
       <p:ext uri="{BB962C8B-B14F-4D97-AF65-F5344CB8AC3E}">
-        <p14:creationId xmlns:p14="http://schemas.microsoft.com/office/powerpoint/2010/main" val="2767470669"/>
+        <p14:creationId xmlns:p14="http://schemas.microsoft.com/office/powerpoint/2010/main" val="1398222947"/>
       </p:ext>
     </p:extLst>
   </p:cSld>
@@ -7083,90 +7119,6 @@
             <a:fld id="{DF030C05-EF6C-9847-8923-580D76870F8E}" type="slidenum">
               <a:rPr lang="en-AU" smtClean="0"/>
               <a:t>28</a:t>
-            </a:fld>
-            <a:endParaRPr lang="en-AU"/>
-          </a:p>
-        </p:txBody>
-      </p:sp>
-    </p:spTree>
-    <p:extLst>
-      <p:ext uri="{BB962C8B-B14F-4D97-AF65-F5344CB8AC3E}">
-        <p14:creationId xmlns:p14="http://schemas.microsoft.com/office/powerpoint/2010/main" val="1398222947"/>
-      </p:ext>
-    </p:extLst>
-  </p:cSld>
-  <p:clrMapOvr>
-    <a:masterClrMapping/>
-  </p:clrMapOvr>
-</p:notes>
-</file>
-
-<file path=ppt/notesSlides/notesSlide29.xml><?xml version="1.0" encoding="utf-8"?>
-<p:notes xmlns:a="http://schemas.openxmlformats.org/drawingml/2006/main" xmlns:r="http://schemas.openxmlformats.org/officeDocument/2006/relationships" xmlns:p="http://schemas.openxmlformats.org/presentationml/2006/main">
-  <p:cSld>
-    <p:spTree>
-      <p:nvGrpSpPr>
-        <p:cNvPr id="1" name=""/>
-        <p:cNvGrpSpPr/>
-        <p:nvPr/>
-      </p:nvGrpSpPr>
-      <p:grpSpPr>
-        <a:xfrm>
-          <a:off x="0" y="0"/>
-          <a:ext cx="0" cy="0"/>
-          <a:chOff x="0" y="0"/>
-          <a:chExt cx="0" cy="0"/>
-        </a:xfrm>
-      </p:grpSpPr>
-      <p:sp>
-        <p:nvSpPr>
-          <p:cNvPr id="2" name="Slide Image Placeholder 1"/>
-          <p:cNvSpPr>
-            <a:spLocks noGrp="1" noRot="1" noChangeAspect="1"/>
-          </p:cNvSpPr>
-          <p:nvPr>
-            <p:ph type="sldImg"/>
-          </p:nvPr>
-        </p:nvSpPr>
-        <p:spPr/>
-      </p:sp>
-      <p:sp>
-        <p:nvSpPr>
-          <p:cNvPr id="3" name="Notes Placeholder 2"/>
-          <p:cNvSpPr>
-            <a:spLocks noGrp="1"/>
-          </p:cNvSpPr>
-          <p:nvPr>
-            <p:ph type="body" idx="1"/>
-          </p:nvPr>
-        </p:nvSpPr>
-        <p:spPr/>
-        <p:txBody>
-          <a:bodyPr/>
-          <a:lstStyle/>
-          <a:p>
-            <a:endParaRPr lang="en-AU" dirty="0"/>
-          </a:p>
-        </p:txBody>
-      </p:sp>
-      <p:sp>
-        <p:nvSpPr>
-          <p:cNvPr id="4" name="Slide Number Placeholder 3"/>
-          <p:cNvSpPr>
-            <a:spLocks noGrp="1"/>
-          </p:cNvSpPr>
-          <p:nvPr>
-            <p:ph type="sldNum" sz="quarter" idx="5"/>
-          </p:nvPr>
-        </p:nvSpPr>
-        <p:spPr/>
-        <p:txBody>
-          <a:bodyPr/>
-          <a:lstStyle/>
-          <a:p>
-            <a:fld id="{DF030C05-EF6C-9847-8923-580D76870F8E}" type="slidenum">
-              <a:rPr lang="en-AU" smtClean="0"/>
-              <a:t>29</a:t>
             </a:fld>
             <a:endParaRPr lang="en-AU"/>
           </a:p>
@@ -7958,7 +7910,7 @@
           <a:p>
             <a:fld id="{88D38747-4367-4BD2-8D51-C97E202738E2}" type="datetime1">
               <a:rPr lang="en-US" smtClean="0"/>
-              <a:t>2/12/2024</a:t>
+              <a:t>2/13/2024</a:t>
             </a:fld>
             <a:endParaRPr lang="en-US" dirty="0"/>
           </a:p>
@@ -8263,7 +8215,7 @@
           <a:p>
             <a:fld id="{11F1B079-7EF0-44EE-B798-BCC497C9F3B2}" type="datetime1">
               <a:rPr lang="en-US" smtClean="0"/>
-              <a:t>2/12/2024</a:t>
+              <a:t>2/13/2024</a:t>
             </a:fld>
             <a:endParaRPr lang="en-US" dirty="0"/>
           </a:p>
@@ -8457,7 +8409,7 @@
           <a:p>
             <a:fld id="{28FF70A8-1D13-4657-95F0-A9EA54967B8D}" type="datetime1">
               <a:rPr lang="en-US" smtClean="0"/>
-              <a:t>2/12/2024</a:t>
+              <a:t>2/13/2024</a:t>
             </a:fld>
             <a:endParaRPr lang="en-US" dirty="0"/>
           </a:p>
@@ -8720,7 +8672,7 @@
           <a:p>
             <a:fld id="{21EB90AC-71BD-4C7F-8ACA-7B3F18292E63}" type="datetime1">
               <a:rPr lang="en-US" smtClean="0"/>
-              <a:t>2/12/2024</a:t>
+              <a:t>2/13/2024</a:t>
             </a:fld>
             <a:endParaRPr lang="en-US" dirty="0"/>
           </a:p>
@@ -9156,7 +9108,7 @@
           <a:p>
             <a:fld id="{4E6EFC2C-8905-46F0-B443-CE905B76BA01}" type="datetime1">
               <a:rPr lang="en-US" smtClean="0"/>
-              <a:t>2/12/2024</a:t>
+              <a:t>2/13/2024</a:t>
             </a:fld>
             <a:endParaRPr lang="en-US" dirty="0"/>
           </a:p>
@@ -9693,7 +9645,7 @@
           <a:p>
             <a:fld id="{D9079DC3-C9B5-499E-9140-0DC28B7074E2}" type="datetime1">
               <a:rPr lang="en-US" smtClean="0"/>
-              <a:t>2/12/2024</a:t>
+              <a:t>2/13/2024</a:t>
             </a:fld>
             <a:endParaRPr lang="en-US" dirty="0"/>
           </a:p>
@@ -10575,7 +10527,7 @@
           <a:p>
             <a:fld id="{30BB33EA-E472-4D22-9C03-A9C14AA21CED}" type="datetime1">
               <a:rPr lang="en-US" smtClean="0"/>
-              <a:t>2/12/2024</a:t>
+              <a:t>2/13/2024</a:t>
             </a:fld>
             <a:endParaRPr lang="en-US" dirty="0"/>
           </a:p>
@@ -10745,7 +10697,7 @@
           <a:p>
             <a:fld id="{217E833E-1B6D-415F-AD29-75AE8C43BD0D}" type="datetime1">
               <a:rPr lang="en-US" smtClean="0"/>
-              <a:t>2/12/2024</a:t>
+              <a:t>2/13/2024</a:t>
             </a:fld>
             <a:endParaRPr lang="en-US" dirty="0"/>
           </a:p>
@@ -10929,7 +10881,7 @@
           <a:p>
             <a:fld id="{8452596F-08A7-4B70-989A-F2B1CF31E66B}" type="datetime1">
               <a:rPr lang="en-US" smtClean="0"/>
-              <a:t>2/12/2024</a:t>
+              <a:t>2/13/2024</a:t>
             </a:fld>
             <a:endParaRPr lang="en-US" dirty="0"/>
           </a:p>
@@ -11099,7 +11051,7 @@
           <a:p>
             <a:fld id="{73C55A3C-5767-4844-A0A3-83778C2E5409}" type="datetime1">
               <a:rPr lang="en-US" smtClean="0"/>
-              <a:t>2/12/2024</a:t>
+              <a:t>2/13/2024</a:t>
             </a:fld>
             <a:endParaRPr lang="en-US" dirty="0"/>
           </a:p>
@@ -11343,7 +11295,7 @@
           <a:p>
             <a:fld id="{CAE507A8-A5CF-4D38-AB86-7EDDA87A85D4}" type="datetime1">
               <a:rPr lang="en-US" smtClean="0"/>
-              <a:t>2/12/2024</a:t>
+              <a:t>2/13/2024</a:t>
             </a:fld>
             <a:endParaRPr lang="en-US" dirty="0"/>
           </a:p>
@@ -11585,7 +11537,7 @@
           <a:p>
             <a:fld id="{BDFCD27C-8599-43EF-BA1D-14DDC1946E06}" type="datetime1">
               <a:rPr lang="en-US" smtClean="0"/>
-              <a:t>2/12/2024</a:t>
+              <a:t>2/13/2024</a:t>
             </a:fld>
             <a:endParaRPr lang="en-US" dirty="0"/>
           </a:p>
@@ -12066,7 +12018,7 @@
           <a:p>
             <a:fld id="{49343D99-809A-49C0-96E5-4250D0B498EE}" type="datetime1">
               <a:rPr lang="en-US" smtClean="0"/>
-              <a:t>2/12/2024</a:t>
+              <a:t>2/13/2024</a:t>
             </a:fld>
             <a:endParaRPr lang="en-US" dirty="0"/>
           </a:p>
@@ -12184,7 +12136,7 @@
           <a:p>
             <a:fld id="{A143DE9B-B678-4EFB-BB7D-A4370204A0B0}" type="datetime1">
               <a:rPr lang="en-US" smtClean="0"/>
-              <a:t>2/12/2024</a:t>
+              <a:t>2/13/2024</a:t>
             </a:fld>
             <a:endParaRPr lang="en-US" dirty="0"/>
           </a:p>
@@ -12279,7 +12231,7 @@
           <a:p>
             <a:fld id="{E68812DA-F765-4142-A6A3-A8ED7235E082}" type="datetime1">
               <a:rPr lang="en-US" smtClean="0"/>
-              <a:t>2/12/2024</a:t>
+              <a:t>2/13/2024</a:t>
             </a:fld>
             <a:endParaRPr lang="en-US" dirty="0"/>
           </a:p>
@@ -12534,7 +12486,7 @@
           <a:p>
             <a:fld id="{3E0277FD-7DE6-41D4-930D-AC99F5AFE54E}" type="datetime1">
               <a:rPr lang="en-US" smtClean="0"/>
-              <a:t>2/12/2024</a:t>
+              <a:t>2/13/2024</a:t>
             </a:fld>
             <a:endParaRPr lang="en-US" dirty="0"/>
           </a:p>
@@ -12841,7 +12793,7 @@
           <a:p>
             <a:fld id="{9EA15526-7079-4B7B-987C-1B5FAE11A0FF}" type="datetime1">
               <a:rPr lang="en-US" smtClean="0"/>
-              <a:t>2/12/2024</a:t>
+              <a:t>2/13/2024</a:t>
             </a:fld>
             <a:endParaRPr lang="en-US" dirty="0"/>
           </a:p>
@@ -13076,7 +13028,7 @@
           <a:p>
             <a:fld id="{073ED0CC-082F-4160-86E5-0D6041F12778}" type="datetime1">
               <a:rPr lang="en-US" smtClean="0"/>
-              <a:t>2/12/2024</a:t>
+              <a:t>2/13/2024</a:t>
             </a:fld>
             <a:endParaRPr lang="en-US" dirty="0"/>
           </a:p>
@@ -15395,7 +15347,7 @@
                 <a:latin typeface="Arial" panose="020B0604020202020204" pitchFamily="34" charset="0"/>
                 <a:cs typeface="Arial" panose="020B0604020202020204" pitchFamily="34" charset="0"/>
               </a:rPr>
-              <a:t>Exam overview will be done in week 12.</a:t>
+              <a:t>Exam overview will be done in week 13.</a:t>
             </a:r>
           </a:p>
           <a:p>
@@ -15497,7 +15449,7 @@
         </p:spPr>
         <p:txBody>
           <a:bodyPr>
-            <a:normAutofit fontScale="92500" lnSpcReduction="20000"/>
+            <a:normAutofit fontScale="85000" lnSpcReduction="20000"/>
           </a:bodyPr>
           <a:lstStyle/>
           <a:p>
@@ -15536,7 +15488,7 @@
                 <a:latin typeface="Arial" panose="020B0604020202020204" pitchFamily="34" charset="0"/>
                 <a:cs typeface="Arial" panose="020B0604020202020204" pitchFamily="34" charset="0"/>
               </a:rPr>
-              <a:t>Computers and Networks</a:t>
+              <a:t>Computer Architecture</a:t>
             </a:r>
           </a:p>
           <a:p>
@@ -15549,7 +15501,7 @@
                 <a:latin typeface="Arial" panose="020B0604020202020204" pitchFamily="34" charset="0"/>
                 <a:cs typeface="Arial" panose="020B0604020202020204" pitchFamily="34" charset="0"/>
               </a:rPr>
-              <a:t>Threats</a:t>
+              <a:t>Computer Networking</a:t>
             </a:r>
           </a:p>
           <a:p>
@@ -15562,7 +15514,7 @@
                 <a:latin typeface="Arial" panose="020B0604020202020204" pitchFamily="34" charset="0"/>
                 <a:cs typeface="Arial" panose="020B0604020202020204" pitchFamily="34" charset="0"/>
               </a:rPr>
-              <a:t>Vulnerabilities</a:t>
+              <a:t>Threats</a:t>
             </a:r>
           </a:p>
           <a:p>
@@ -15575,7 +15527,7 @@
                 <a:latin typeface="Arial" panose="020B0604020202020204" pitchFamily="34" charset="0"/>
                 <a:cs typeface="Arial" panose="020B0604020202020204" pitchFamily="34" charset="0"/>
               </a:rPr>
-              <a:t>Security management</a:t>
+              <a:t>Vulnerabilities</a:t>
             </a:r>
           </a:p>
           <a:p>
@@ -15588,7 +15540,7 @@
                 <a:latin typeface="Arial" panose="020B0604020202020204" pitchFamily="34" charset="0"/>
                 <a:cs typeface="Arial" panose="020B0604020202020204" pitchFamily="34" charset="0"/>
               </a:rPr>
-              <a:t>Incidents</a:t>
+              <a:t>Incidents and Security Management</a:t>
             </a:r>
           </a:p>
           <a:p>
@@ -15628,6 +15580,19 @@
                 <a:cs typeface="Arial" panose="020B0604020202020204" pitchFamily="34" charset="0"/>
               </a:rPr>
               <a:t>Cyber Law</a:t>
+            </a:r>
+          </a:p>
+          <a:p>
+            <a:pPr marL="494100" indent="-457200">
+              <a:buFont typeface="+mj-lt"/>
+              <a:buAutoNum type="arabicPeriod"/>
+            </a:pPr>
+            <a:r>
+              <a:rPr lang="en-AU" dirty="0">
+                <a:latin typeface="Arial" panose="020B0604020202020204" pitchFamily="34" charset="0"/>
+                <a:cs typeface="Arial" panose="020B0604020202020204" pitchFamily="34" charset="0"/>
+              </a:rPr>
+              <a:t>Project Work</a:t>
             </a:r>
           </a:p>
           <a:p>
@@ -15903,154 +15868,6 @@
 </file>
 
 <file path=ppt/slides/slide20.xml><?xml version="1.0" encoding="utf-8"?>
-<p:sld xmlns:a="http://schemas.openxmlformats.org/drawingml/2006/main" xmlns:r="http://schemas.openxmlformats.org/officeDocument/2006/relationships" xmlns:p="http://schemas.openxmlformats.org/presentationml/2006/main">
-  <p:cSld>
-    <p:spTree>
-      <p:nvGrpSpPr>
-        <p:cNvPr id="1" name=""/>
-        <p:cNvGrpSpPr/>
-        <p:nvPr/>
-      </p:nvGrpSpPr>
-      <p:grpSpPr>
-        <a:xfrm>
-          <a:off x="0" y="0"/>
-          <a:ext cx="0" cy="0"/>
-          <a:chOff x="0" y="0"/>
-          <a:chExt cx="0" cy="0"/>
-        </a:xfrm>
-      </p:grpSpPr>
-      <p:sp>
-        <p:nvSpPr>
-          <p:cNvPr id="2" name="Title 1"/>
-          <p:cNvSpPr>
-            <a:spLocks noGrp="1"/>
-          </p:cNvSpPr>
-          <p:nvPr>
-            <p:ph type="title"/>
-          </p:nvPr>
-        </p:nvSpPr>
-        <p:spPr>
-          <a:xfrm>
-            <a:off x="3729788" y="14037"/>
-            <a:ext cx="5125453" cy="996616"/>
-          </a:xfrm>
-        </p:spPr>
-        <p:txBody>
-          <a:bodyPr/>
-          <a:lstStyle/>
-          <a:p>
-            <a:r>
-              <a:rPr lang="en-AU"/>
-              <a:t>FAQs </a:t>
-            </a:r>
-            <a:endParaRPr lang="en-AU" dirty="0"/>
-          </a:p>
-        </p:txBody>
-      </p:sp>
-      <p:sp>
-        <p:nvSpPr>
-          <p:cNvPr id="3" name="Content Placeholder 2"/>
-          <p:cNvSpPr>
-            <a:spLocks noGrp="1"/>
-          </p:cNvSpPr>
-          <p:nvPr>
-            <p:ph idx="1"/>
-          </p:nvPr>
-        </p:nvSpPr>
-        <p:spPr>
-          <a:xfrm>
-            <a:off x="549442" y="1010653"/>
-            <a:ext cx="11093115" cy="5246712"/>
-          </a:xfrm>
-        </p:spPr>
-        <p:txBody>
-          <a:bodyPr>
-            <a:normAutofit/>
-          </a:bodyPr>
-          <a:lstStyle/>
-          <a:p>
-            <a:pPr marL="0" indent="0">
-              <a:buNone/>
-            </a:pPr>
-            <a:endParaRPr lang="en-US" dirty="0"/>
-          </a:p>
-          <a:p>
-            <a:pPr marL="0" indent="0">
-              <a:buNone/>
-            </a:pPr>
-            <a:r>
-              <a:rPr lang="en-US" dirty="0">
-                <a:latin typeface="Arial" panose="020B0604020202020204" pitchFamily="34" charset="0"/>
-                <a:cs typeface="Arial" panose="020B0604020202020204" pitchFamily="34" charset="0"/>
-              </a:rPr>
-              <a:t>Q: Why don’t we get sample answers for labs (and others)?</a:t>
-            </a:r>
-          </a:p>
-          <a:p>
-            <a:pPr marL="0" indent="0">
-              <a:buNone/>
-            </a:pPr>
-            <a:r>
-              <a:rPr lang="en-US" dirty="0">
-                <a:latin typeface="Arial" panose="020B0604020202020204" pitchFamily="34" charset="0"/>
-                <a:cs typeface="Arial" panose="020B0604020202020204" pitchFamily="34" charset="0"/>
-              </a:rPr>
-              <a:t>A: </a:t>
-            </a:r>
-          </a:p>
-          <a:p>
-            <a:r>
-              <a:rPr lang="en-US" dirty="0">
-                <a:latin typeface="Arial" panose="020B0604020202020204" pitchFamily="34" charset="0"/>
-                <a:cs typeface="Arial" panose="020B0604020202020204" pitchFamily="34" charset="0"/>
-              </a:rPr>
-              <a:t>The lab solutions for this unit can be different significantly from one to another, even with reasonably simple questions.</a:t>
-            </a:r>
-          </a:p>
-          <a:p>
-            <a:r>
-              <a:rPr lang="en-US" dirty="0">
-                <a:latin typeface="Arial" panose="020B0604020202020204" pitchFamily="34" charset="0"/>
-                <a:cs typeface="Arial" panose="020B0604020202020204" pitchFamily="34" charset="0"/>
-              </a:rPr>
-              <a:t>We simply don’t want you to learn sample answers, but rather learn to explore various ways of solving (i.e., improve problem solving skills).</a:t>
-            </a:r>
-          </a:p>
-          <a:p>
-            <a:r>
-              <a:rPr lang="en-US" dirty="0">
-                <a:latin typeface="Arial" panose="020B0604020202020204" pitchFamily="34" charset="0"/>
-                <a:cs typeface="Arial" panose="020B0604020202020204" pitchFamily="34" charset="0"/>
-              </a:rPr>
-              <a:t>We (facilitators and lecturers) are happy to discuss your solution, work out what might be going wrong and try to fix it with you.</a:t>
-            </a:r>
-            <a:endParaRPr lang="en-AU" dirty="0">
-              <a:latin typeface="Arial" panose="020B0604020202020204" pitchFamily="34" charset="0"/>
-              <a:cs typeface="Arial" panose="020B0604020202020204" pitchFamily="34" charset="0"/>
-            </a:endParaRPr>
-          </a:p>
-          <a:p>
-            <a:endParaRPr lang="en-AU" dirty="0">
-              <a:latin typeface="Arial" panose="020B0604020202020204" pitchFamily="34" charset="0"/>
-              <a:cs typeface="Arial" panose="020B0604020202020204" pitchFamily="34" charset="0"/>
-            </a:endParaRPr>
-          </a:p>
-        </p:txBody>
-      </p:sp>
-    </p:spTree>
-    <p:extLst>
-      <p:ext uri="{BB962C8B-B14F-4D97-AF65-F5344CB8AC3E}">
-        <p14:creationId xmlns:p14="http://schemas.microsoft.com/office/powerpoint/2010/main" val="1821654354"/>
-      </p:ext>
-    </p:extLst>
-  </p:cSld>
-  <p:clrMapOvr>
-    <a:masterClrMapping/>
-  </p:clrMapOvr>
-</p:sld>
-</file>
-
-<file path=ppt/slides/slide21.xml><?xml version="1.0" encoding="utf-8"?>
 <p:sld xmlns:a="http://schemas.openxmlformats.org/drawingml/2006/main" xmlns:r="http://schemas.openxmlformats.org/officeDocument/2006/relationships" xmlns:p="http://schemas.openxmlformats.org/presentationml/2006/main">
   <p:cSld>
     <p:spTree>
@@ -16201,6 +16018,231 @@
 </p:sld>
 </file>
 
+<file path=ppt/slides/slide21.xml><?xml version="1.0" encoding="utf-8"?>
+<p:sld xmlns:a="http://schemas.openxmlformats.org/drawingml/2006/main" xmlns:r="http://schemas.openxmlformats.org/officeDocument/2006/relationships" xmlns:p="http://schemas.openxmlformats.org/presentationml/2006/main">
+  <p:cSld>
+    <p:spTree>
+      <p:nvGrpSpPr>
+        <p:cNvPr id="1" name=""/>
+        <p:cNvGrpSpPr/>
+        <p:nvPr/>
+      </p:nvGrpSpPr>
+      <p:grpSpPr>
+        <a:xfrm>
+          <a:off x="0" y="0"/>
+          <a:ext cx="0" cy="0"/>
+          <a:chOff x="0" y="0"/>
+          <a:chExt cx="0" cy="0"/>
+        </a:xfrm>
+      </p:grpSpPr>
+      <p:sp>
+        <p:nvSpPr>
+          <p:cNvPr id="2" name="Title 1">
+            <a:extLst>
+              <a:ext uri="{FF2B5EF4-FFF2-40B4-BE49-F238E27FC236}">
+                <a16:creationId xmlns:a16="http://schemas.microsoft.com/office/drawing/2014/main" id="{5C4F01C5-5333-2248-B03B-703C97F7CC69}"/>
+              </a:ext>
+            </a:extLst>
+          </p:cNvPr>
+          <p:cNvSpPr>
+            <a:spLocks noGrp="1"/>
+          </p:cNvSpPr>
+          <p:nvPr>
+            <p:ph type="title"/>
+          </p:nvPr>
+        </p:nvSpPr>
+        <p:spPr/>
+        <p:txBody>
+          <a:bodyPr/>
+          <a:lstStyle/>
+          <a:p>
+            <a:r>
+              <a:rPr lang="en-AU" dirty="0"/>
+              <a:t>Information Security</a:t>
+            </a:r>
+          </a:p>
+        </p:txBody>
+      </p:sp>
+      <p:sp>
+        <p:nvSpPr>
+          <p:cNvPr id="3" name="Content Placeholder 2">
+            <a:extLst>
+              <a:ext uri="{FF2B5EF4-FFF2-40B4-BE49-F238E27FC236}">
+                <a16:creationId xmlns:a16="http://schemas.microsoft.com/office/drawing/2014/main" id="{F7DD7DCB-C7E2-1B4F-BD83-3B7AF005DD76}"/>
+              </a:ext>
+            </a:extLst>
+          </p:cNvPr>
+          <p:cNvSpPr>
+            <a:spLocks noGrp="1"/>
+          </p:cNvSpPr>
+          <p:nvPr>
+            <p:ph idx="1"/>
+          </p:nvPr>
+        </p:nvSpPr>
+        <p:spPr/>
+        <p:txBody>
+          <a:bodyPr>
+            <a:normAutofit/>
+          </a:bodyPr>
+          <a:lstStyle/>
+          <a:p>
+            <a:r>
+              <a:rPr lang="en-AU" dirty="0">
+                <a:latin typeface="Arial" panose="020B0604020202020204" pitchFamily="34" charset="0"/>
+                <a:cs typeface="Arial" panose="020B0604020202020204" pitchFamily="34" charset="0"/>
+              </a:rPr>
+              <a:t>All human endeavour relies on information </a:t>
+            </a:r>
+          </a:p>
+          <a:p>
+            <a:pPr lvl="1"/>
+            <a:r>
+              <a:rPr lang="en-AU" dirty="0">
+                <a:latin typeface="Arial" panose="020B0604020202020204" pitchFamily="34" charset="0"/>
+                <a:cs typeface="Arial" panose="020B0604020202020204" pitchFamily="34" charset="0"/>
+              </a:rPr>
+              <a:t>Business, Government, Education, Research, Personal life</a:t>
+            </a:r>
+          </a:p>
+          <a:p>
+            <a:r>
+              <a:rPr lang="en-AU" dirty="0">
+                <a:latin typeface="Arial" panose="020B0604020202020204" pitchFamily="34" charset="0"/>
+                <a:cs typeface="Arial" panose="020B0604020202020204" pitchFamily="34" charset="0"/>
+              </a:rPr>
+              <a:t>Information security is about protecting this information from “unauthorised access, harm or misuse”</a:t>
+            </a:r>
+            <a:r>
+              <a:rPr lang="en-AU" baseline="30000" dirty="0">
+                <a:latin typeface="Arial" panose="020B0604020202020204" pitchFamily="34" charset="0"/>
+                <a:cs typeface="Arial" panose="020B0604020202020204" pitchFamily="34" charset="0"/>
+              </a:rPr>
+              <a:t>1</a:t>
+            </a:r>
+            <a:endParaRPr lang="en-AU" dirty="0">
+              <a:latin typeface="Arial" panose="020B0604020202020204" pitchFamily="34" charset="0"/>
+              <a:cs typeface="Arial" panose="020B0604020202020204" pitchFamily="34" charset="0"/>
+            </a:endParaRPr>
+          </a:p>
+          <a:p>
+            <a:r>
+              <a:rPr lang="en-AU" dirty="0">
+                <a:latin typeface="Arial" panose="020B0604020202020204" pitchFamily="34" charset="0"/>
+                <a:cs typeface="Arial" panose="020B0604020202020204" pitchFamily="34" charset="0"/>
+              </a:rPr>
+              <a:t>This is done by preserving </a:t>
+            </a:r>
+            <a:r>
+              <a:rPr lang="en-AU" u="sng" dirty="0">
+                <a:solidFill>
+                  <a:srgbClr val="00B0F0"/>
+                </a:solidFill>
+                <a:latin typeface="Arial" panose="020B0604020202020204" pitchFamily="34" charset="0"/>
+                <a:cs typeface="Arial" panose="020B0604020202020204" pitchFamily="34" charset="0"/>
+              </a:rPr>
+              <a:t>C</a:t>
+            </a:r>
+            <a:r>
+              <a:rPr lang="en-AU" dirty="0">
+                <a:latin typeface="Arial" panose="020B0604020202020204" pitchFamily="34" charset="0"/>
+                <a:cs typeface="Arial" panose="020B0604020202020204" pitchFamily="34" charset="0"/>
+              </a:rPr>
+              <a:t>onfidentiality, </a:t>
+            </a:r>
+            <a:r>
+              <a:rPr lang="en-AU" u="sng" dirty="0">
+                <a:solidFill>
+                  <a:srgbClr val="00B0F0"/>
+                </a:solidFill>
+                <a:latin typeface="Arial" panose="020B0604020202020204" pitchFamily="34" charset="0"/>
+                <a:cs typeface="Arial" panose="020B0604020202020204" pitchFamily="34" charset="0"/>
+              </a:rPr>
+              <a:t>I</a:t>
+            </a:r>
+            <a:r>
+              <a:rPr lang="en-AU" dirty="0">
+                <a:latin typeface="Arial" panose="020B0604020202020204" pitchFamily="34" charset="0"/>
+                <a:cs typeface="Arial" panose="020B0604020202020204" pitchFamily="34" charset="0"/>
+              </a:rPr>
+              <a:t>ntegrity and </a:t>
+            </a:r>
+            <a:r>
+              <a:rPr lang="en-AU" u="sng" dirty="0">
+                <a:solidFill>
+                  <a:srgbClr val="00B0F0"/>
+                </a:solidFill>
+                <a:latin typeface="Arial" panose="020B0604020202020204" pitchFamily="34" charset="0"/>
+                <a:cs typeface="Arial" panose="020B0604020202020204" pitchFamily="34" charset="0"/>
+              </a:rPr>
+              <a:t>A</a:t>
+            </a:r>
+            <a:r>
+              <a:rPr lang="en-AU" dirty="0">
+                <a:latin typeface="Arial" panose="020B0604020202020204" pitchFamily="34" charset="0"/>
+                <a:cs typeface="Arial" panose="020B0604020202020204" pitchFamily="34" charset="0"/>
+              </a:rPr>
+              <a:t>vailability of information</a:t>
+            </a:r>
+          </a:p>
+        </p:txBody>
+      </p:sp>
+      <p:sp>
+        <p:nvSpPr>
+          <p:cNvPr id="4" name="Footer Placeholder 3">
+            <a:extLst>
+              <a:ext uri="{FF2B5EF4-FFF2-40B4-BE49-F238E27FC236}">
+                <a16:creationId xmlns:a16="http://schemas.microsoft.com/office/drawing/2014/main" id="{5293465A-4C2A-754E-8F5A-63A08A730A0E}"/>
+              </a:ext>
+            </a:extLst>
+          </p:cNvPr>
+          <p:cNvSpPr>
+            <a:spLocks noGrp="1"/>
+          </p:cNvSpPr>
+          <p:nvPr>
+            <p:ph type="ftr" sz="quarter" idx="11"/>
+          </p:nvPr>
+        </p:nvSpPr>
+        <p:spPr/>
+        <p:txBody>
+          <a:bodyPr/>
+          <a:lstStyle/>
+          <a:p>
+            <a:r>
+              <a:rPr lang="en-US" dirty="0"/>
+              <a:t>1 </a:t>
+            </a:r>
+            <a:r>
+              <a:rPr lang="en-US" dirty="0" err="1"/>
+              <a:t>Cybok</a:t>
+            </a:r>
+            <a:r>
+              <a:rPr lang="en-US" dirty="0"/>
+              <a:t> 1.0 2019 https://</a:t>
+            </a:r>
+            <a:r>
+              <a:rPr lang="en-US" dirty="0" err="1"/>
+              <a:t>www.cybok.org</a:t>
+            </a:r>
+            <a:r>
+              <a:rPr lang="en-US" dirty="0"/>
+              <a:t>/media/downloads/CyBOK_version_1.0_YMKBy7a.pdf</a:t>
+            </a:r>
+          </a:p>
+        </p:txBody>
+      </p:sp>
+    </p:spTree>
+    <p:extLst>
+      <p:ext uri="{BB962C8B-B14F-4D97-AF65-F5344CB8AC3E}">
+        <p14:creationId xmlns:p14="http://schemas.microsoft.com/office/powerpoint/2010/main" val="1476963364"/>
+      </p:ext>
+    </p:extLst>
+  </p:cSld>
+  <p:clrMapOvr>
+    <a:masterClrMapping/>
+  </p:clrMapOvr>
+</p:sld>
+</file>
+
 <file path=ppt/slides/slide22.xml><?xml version="1.0" encoding="utf-8"?>
 <p:sld xmlns:a="http://schemas.openxmlformats.org/drawingml/2006/main" xmlns:r="http://schemas.openxmlformats.org/officeDocument/2006/relationships" xmlns:p="http://schemas.openxmlformats.org/presentationml/2006/main">
   <p:cSld>
@@ -16241,7 +16283,7 @@
           <a:p>
             <a:r>
               <a:rPr lang="en-AU" dirty="0"/>
-              <a:t>Information Security</a:t>
+              <a:t>What is Cybersecurity?</a:t>
             </a:r>
           </a:p>
         </p:txBody>
@@ -16274,33 +16316,54 @@
                 <a:latin typeface="Arial" panose="020B0604020202020204" pitchFamily="34" charset="0"/>
                 <a:cs typeface="Arial" panose="020B0604020202020204" pitchFamily="34" charset="0"/>
               </a:rPr>
-              <a:t>All human endeavour relies on information </a:t>
-            </a:r>
-          </a:p>
-          <a:p>
-            <a:pPr lvl="1"/>
-            <a:r>
-              <a:rPr lang="en-AU" dirty="0">
+              <a:t>Cybersecurity is a subset of Information Security that concerns the digital realm – so:</a:t>
+            </a:r>
+          </a:p>
+          <a:p>
+            <a:pPr marL="414000" lvl="1" indent="0">
+              <a:buNone/>
+            </a:pPr>
+            <a:r>
+              <a:rPr lang="en-AU" b="1" i="1" dirty="0">
+                <a:effectLst/>
                 <a:latin typeface="Arial" panose="020B0604020202020204" pitchFamily="34" charset="0"/>
                 <a:cs typeface="Arial" panose="020B0604020202020204" pitchFamily="34" charset="0"/>
               </a:rPr>
-              <a:t>Business, Government, Education, Research, Personal life</a:t>
-            </a:r>
-          </a:p>
-          <a:p>
+              <a:t>Cyber security </a:t>
+            </a:r>
             <a:r>
               <a:rPr lang="en-AU" dirty="0">
+                <a:effectLst/>
                 <a:latin typeface="Arial" panose="020B0604020202020204" pitchFamily="34" charset="0"/>
                 <a:cs typeface="Arial" panose="020B0604020202020204" pitchFamily="34" charset="0"/>
               </a:rPr>
-              <a:t>Information security is about protecting this information from “unauthorised access, harm or misuse”</a:t>
+              <a:t>refers to the protection of information systems (hardware, software and associated infrastructure), the data on them, and the services they provide, from unauthorised access, harm or misuse. This includes harm caused intentionally by the operator of the system, or accidentally, as a result of failing to follow security procedures.</a:t>
             </a:r>
             <a:r>
               <a:rPr lang="en-AU" baseline="30000" dirty="0">
+                <a:effectLst/>
                 <a:latin typeface="Arial" panose="020B0604020202020204" pitchFamily="34" charset="0"/>
                 <a:cs typeface="Arial" panose="020B0604020202020204" pitchFamily="34" charset="0"/>
               </a:rPr>
               <a:t>1</a:t>
+            </a:r>
+            <a:r>
+              <a:rPr lang="en-AU" dirty="0">
+                <a:effectLst/>
+                <a:latin typeface="Arial" panose="020B0604020202020204" pitchFamily="34" charset="0"/>
+                <a:cs typeface="Arial" panose="020B0604020202020204" pitchFamily="34" charset="0"/>
+              </a:rPr>
+              <a:t> </a:t>
+            </a:r>
+          </a:p>
+          <a:p>
+            <a:r>
+              <a:rPr lang="en-AU" dirty="0">
+                <a:effectLst/>
+                <a:latin typeface="Arial" panose="020B0604020202020204" pitchFamily="34" charset="0"/>
+                <a:cs typeface="Arial" panose="020B0604020202020204" pitchFamily="34" charset="0"/>
+              </a:rPr>
+              <a:t>CIA is sometimes extended to include Authentication, Accountability, Non-Repudiation and Reliability</a:t>
             </a:r>
             <a:endParaRPr lang="en-AU" dirty="0">
               <a:latin typeface="Arial" panose="020B0604020202020204" pitchFamily="34" charset="0"/>
@@ -16308,115 +16371,17 @@
             </a:endParaRPr>
           </a:p>
           <a:p>
-            <a:r>
-              <a:rPr lang="en-AU" dirty="0">
-                <a:latin typeface="Arial" panose="020B0604020202020204" pitchFamily="34" charset="0"/>
-                <a:cs typeface="Arial" panose="020B0604020202020204" pitchFamily="34" charset="0"/>
-              </a:rPr>
-              <a:t>This is done by preserving </a:t>
-            </a:r>
-            <a:r>
-              <a:rPr lang="en-AU" u="sng" dirty="0">
-                <a:solidFill>
-                  <a:srgbClr val="00B0F0"/>
-                </a:solidFill>
-                <a:latin typeface="Arial" panose="020B0604020202020204" pitchFamily="34" charset="0"/>
-                <a:cs typeface="Arial" panose="020B0604020202020204" pitchFamily="34" charset="0"/>
-              </a:rPr>
-              <a:t>C</a:t>
-            </a:r>
-            <a:r>
-              <a:rPr lang="en-AU" dirty="0">
-                <a:latin typeface="Arial" panose="020B0604020202020204" pitchFamily="34" charset="0"/>
-                <a:cs typeface="Arial" panose="020B0604020202020204" pitchFamily="34" charset="0"/>
-              </a:rPr>
-              <a:t>onfidentiality, </a:t>
-            </a:r>
-            <a:r>
-              <a:rPr lang="en-AU" u="sng" dirty="0">
-                <a:solidFill>
-                  <a:srgbClr val="00B0F0"/>
-                </a:solidFill>
-                <a:latin typeface="Arial" panose="020B0604020202020204" pitchFamily="34" charset="0"/>
-                <a:cs typeface="Arial" panose="020B0604020202020204" pitchFamily="34" charset="0"/>
-              </a:rPr>
-              <a:t>I</a:t>
-            </a:r>
-            <a:r>
-              <a:rPr lang="en-AU" dirty="0">
-                <a:latin typeface="Arial" panose="020B0604020202020204" pitchFamily="34" charset="0"/>
-                <a:cs typeface="Arial" panose="020B0604020202020204" pitchFamily="34" charset="0"/>
-              </a:rPr>
-              <a:t>ntegrity and </a:t>
-            </a:r>
-            <a:r>
-              <a:rPr lang="en-AU" u="sng" dirty="0">
-                <a:solidFill>
-                  <a:srgbClr val="00B0F0"/>
-                </a:solidFill>
-                <a:latin typeface="Arial" panose="020B0604020202020204" pitchFamily="34" charset="0"/>
-                <a:cs typeface="Arial" panose="020B0604020202020204" pitchFamily="34" charset="0"/>
-              </a:rPr>
-              <a:t>A</a:t>
-            </a:r>
-            <a:r>
-              <a:rPr lang="en-AU" dirty="0">
-                <a:latin typeface="Arial" panose="020B0604020202020204" pitchFamily="34" charset="0"/>
-                <a:cs typeface="Arial" panose="020B0604020202020204" pitchFamily="34" charset="0"/>
-              </a:rPr>
-              <a:t>vailability of information</a:t>
-            </a:r>
-          </a:p>
-        </p:txBody>
-      </p:sp>
-      <p:sp>
-        <p:nvSpPr>
-          <p:cNvPr id="4" name="Footer Placeholder 3">
-            <a:extLst>
-              <a:ext uri="{FF2B5EF4-FFF2-40B4-BE49-F238E27FC236}">
-                <a16:creationId xmlns:a16="http://schemas.microsoft.com/office/drawing/2014/main" id="{5293465A-4C2A-754E-8F5A-63A08A730A0E}"/>
-              </a:ext>
-            </a:extLst>
-          </p:cNvPr>
-          <p:cNvSpPr>
-            <a:spLocks noGrp="1"/>
-          </p:cNvSpPr>
-          <p:nvPr>
-            <p:ph type="ftr" sz="quarter" idx="11"/>
-          </p:nvPr>
-        </p:nvSpPr>
-        <p:spPr/>
-        <p:txBody>
-          <a:bodyPr/>
-          <a:lstStyle/>
-          <a:p>
-            <a:r>
-              <a:rPr lang="en-US" dirty="0"/>
-              <a:t>1 </a:t>
-            </a:r>
-            <a:r>
-              <a:rPr lang="en-US" dirty="0" err="1"/>
-              <a:t>Cybok</a:t>
-            </a:r>
-            <a:r>
-              <a:rPr lang="en-US" dirty="0"/>
-              <a:t> 1.0 2019 https://</a:t>
-            </a:r>
-            <a:r>
-              <a:rPr lang="en-US" dirty="0" err="1"/>
-              <a:t>www.cybok.org</a:t>
-            </a:r>
-            <a:r>
-              <a:rPr lang="en-US" dirty="0"/>
-              <a:t>/media/downloads/CyBOK_version_1.0_YMKBy7a.pdf</a:t>
-            </a:r>
+            <a:endParaRPr lang="en-AU" dirty="0">
+              <a:latin typeface="Arial" panose="020B0604020202020204" pitchFamily="34" charset="0"/>
+              <a:cs typeface="Arial" panose="020B0604020202020204" pitchFamily="34" charset="0"/>
+            </a:endParaRPr>
           </a:p>
         </p:txBody>
       </p:sp>
     </p:spTree>
     <p:extLst>
       <p:ext uri="{BB962C8B-B14F-4D97-AF65-F5344CB8AC3E}">
-        <p14:creationId xmlns:p14="http://schemas.microsoft.com/office/powerpoint/2010/main" val="1476963364"/>
+        <p14:creationId xmlns:p14="http://schemas.microsoft.com/office/powerpoint/2010/main" val="2850690858"/>
       </p:ext>
     </p:extLst>
   </p:cSld>
@@ -16429,6 +16394,25 @@
 <file path=ppt/slides/slide23.xml><?xml version="1.0" encoding="utf-8"?>
 <p:sld xmlns:a="http://schemas.openxmlformats.org/drawingml/2006/main" xmlns:r="http://schemas.openxmlformats.org/officeDocument/2006/relationships" xmlns:p="http://schemas.openxmlformats.org/presentationml/2006/main">
   <p:cSld>
+    <p:bg>
+      <p:bgPr>
+        <a:blipFill rotWithShape="1">
+          <a:blip r:embed="rId3">
+            <a:duotone>
+              <a:schemeClr val="bg1">
+                <a:shade val="80000"/>
+                <a:lumMod val="80000"/>
+              </a:schemeClr>
+              <a:schemeClr val="bg1">
+                <a:tint val="98000"/>
+              </a:schemeClr>
+            </a:duotone>
+          </a:blip>
+          <a:stretch/>
+        </a:blipFill>
+        <a:effectLst/>
+      </p:bgPr>
+    </p:bg>
     <p:spTree>
       <p:nvGrpSpPr>
         <p:cNvPr id="1" name=""/>
@@ -16443,6 +16427,66 @@
           <a:chExt cx="0" cy="0"/>
         </a:xfrm>
       </p:grpSpPr>
+      <p:sp useBgFill="1">
+        <p:nvSpPr>
+          <p:cNvPr id="27" name="Rectangle 26">
+            <a:extLst>
+              <a:ext uri="{FF2B5EF4-FFF2-40B4-BE49-F238E27FC236}">
+                <a16:creationId xmlns:a16="http://schemas.microsoft.com/office/drawing/2014/main" id="{1E70A317-DCED-4E80-AA2D-467D8702E5CB}"/>
+              </a:ext>
+              <a:ext uri="{C183D7F6-B498-43B3-948B-1728B52AA6E4}">
+                <adec:decorative xmlns:adec="http://schemas.microsoft.com/office/drawing/2017/decorative" val="1"/>
+              </a:ext>
+            </a:extLst>
+          </p:cNvPr>
+          <p:cNvSpPr>
+            <a:spLocks noGrp="1" noRot="1" noChangeAspect="1" noMove="1" noResize="1" noEditPoints="1" noAdjustHandles="1" noChangeArrowheads="1" noChangeShapeType="1" noTextEdit="1"/>
+          </p:cNvSpPr>
+          <p:nvPr>
+            <p:extLst>
+              <p:ext uri="{386F3935-93C4-4BCD-93E2-E3B085C9AB24}">
+                <p16:designElem xmlns:p16="http://schemas.microsoft.com/office/powerpoint/2015/main" val="1"/>
+              </p:ext>
+            </p:extLst>
+          </p:nvPr>
+        </p:nvSpPr>
+        <p:spPr>
+          <a:xfrm>
+            <a:off x="0" y="0"/>
+            <a:ext cx="12192000" cy="6858000"/>
+          </a:xfrm>
+          <a:prstGeom prst="rect">
+            <a:avLst/>
+          </a:prstGeom>
+          <a:ln>
+            <a:noFill/>
+          </a:ln>
+        </p:spPr>
+        <p:style>
+          <a:lnRef idx="2">
+            <a:schemeClr val="accent1">
+              <a:shade val="50000"/>
+            </a:schemeClr>
+          </a:lnRef>
+          <a:fillRef idx="1">
+            <a:schemeClr val="accent1"/>
+          </a:fillRef>
+          <a:effectRef idx="0">
+            <a:schemeClr val="accent1"/>
+          </a:effectRef>
+          <a:fontRef idx="minor">
+            <a:schemeClr val="lt1"/>
+          </a:fontRef>
+        </p:style>
+        <p:txBody>
+          <a:bodyPr rtlCol="0" anchor="ctr"/>
+          <a:lstStyle/>
+          <a:p>
+            <a:pPr algn="ctr"/>
+            <a:endParaRPr lang="en-US"/>
+          </a:p>
+        </p:txBody>
+      </p:sp>
       <p:sp>
         <p:nvSpPr>
           <p:cNvPr id="2" name="Title 1">
@@ -16459,24 +16503,32 @@
             <p:ph type="title"/>
           </p:nvPr>
         </p:nvSpPr>
-        <p:spPr/>
-        <p:txBody>
-          <a:bodyPr/>
+        <p:spPr>
+          <a:xfrm>
+            <a:off x="861791" y="835383"/>
+            <a:ext cx="3382832" cy="3499549"/>
+          </a:xfrm>
+        </p:spPr>
+        <p:txBody>
+          <a:bodyPr vert="horz" lIns="91440" tIns="45720" rIns="91440" bIns="45720" rtlCol="0" anchor="b">
+            <a:normAutofit/>
+          </a:bodyPr>
           <a:lstStyle/>
           <a:p>
-            <a:r>
-              <a:rPr lang="en-AU" dirty="0"/>
-              <a:t>What is Cybersecurity?</a:t>
-            </a:r>
-          </a:p>
-        </p:txBody>
-      </p:sp>
-      <p:sp>
-        <p:nvSpPr>
-          <p:cNvPr id="3" name="Content Placeholder 2">
+            <a:pPr algn="l"/>
+            <a:r>
+              <a:rPr lang="en-US" sz="4200" dirty="0"/>
+              <a:t>Human Threats</a:t>
+            </a:r>
+          </a:p>
+        </p:txBody>
+      </p:sp>
+      <p:sp>
+        <p:nvSpPr>
+          <p:cNvPr id="19" name="Content Placeholder 18">
             <a:extLst>
               <a:ext uri="{FF2B5EF4-FFF2-40B4-BE49-F238E27FC236}">
-                <a16:creationId xmlns:a16="http://schemas.microsoft.com/office/drawing/2014/main" id="{F7DD7DCB-C7E2-1B4F-BD83-3B7AF005DD76}"/>
+                <a16:creationId xmlns:a16="http://schemas.microsoft.com/office/drawing/2014/main" id="{F6948037-86E0-421A-B96C-F87438C98CFD}"/>
               </a:ext>
             </a:extLst>
           </p:cNvPr>
@@ -16487,84 +16539,218 @@
             <p:ph idx="1"/>
           </p:nvPr>
         </p:nvSpPr>
-        <p:spPr/>
-        <p:txBody>
-          <a:bodyPr>
+        <p:spPr>
+          <a:xfrm>
+            <a:off x="861789" y="4334933"/>
+            <a:ext cx="3382831" cy="1185333"/>
+          </a:xfrm>
+        </p:spPr>
+        <p:txBody>
+          <a:bodyPr vert="horz" lIns="91440" tIns="45720" rIns="91440" bIns="45720" rtlCol="0" anchor="t">
             <a:normAutofit/>
           </a:bodyPr>
           <a:lstStyle/>
           <a:p>
-            <a:r>
-              <a:rPr lang="en-AU" dirty="0">
-                <a:latin typeface="Arial" panose="020B0604020202020204" pitchFamily="34" charset="0"/>
-                <a:cs typeface="Arial" panose="020B0604020202020204" pitchFamily="34" charset="0"/>
-              </a:rPr>
-              <a:t>Cybersecurity is a subset of Information Security that concerns the digital realm – so:</a:t>
-            </a:r>
-          </a:p>
-          <a:p>
-            <a:pPr marL="414000" lvl="1" indent="0">
+            <a:pPr marL="0" indent="0">
               <a:buNone/>
             </a:pPr>
             <a:r>
-              <a:rPr lang="en-AU" b="1" i="1" dirty="0">
-                <a:effectLst/>
-                <a:latin typeface="Arial" panose="020B0604020202020204" pitchFamily="34" charset="0"/>
-                <a:cs typeface="Arial" panose="020B0604020202020204" pitchFamily="34" charset="0"/>
-              </a:rPr>
-              <a:t>Cyber security </a:t>
-            </a:r>
-            <a:r>
-              <a:rPr lang="en-AU" dirty="0">
-                <a:effectLst/>
-                <a:latin typeface="Arial" panose="020B0604020202020204" pitchFamily="34" charset="0"/>
-                <a:cs typeface="Arial" panose="020B0604020202020204" pitchFamily="34" charset="0"/>
-              </a:rPr>
-              <a:t>refers to the protection of information systems (hardware, software and associated infrastructure), the data on them, and the services they provide, from unauthorised access, harm or misuse. This includes harm caused intentionally by the operator of the system, or accidentally, as a result of failing to follow security procedures.</a:t>
-            </a:r>
-            <a:r>
-              <a:rPr lang="en-AU" baseline="30000" dirty="0">
-                <a:effectLst/>
-                <a:latin typeface="Arial" panose="020B0604020202020204" pitchFamily="34" charset="0"/>
-                <a:cs typeface="Arial" panose="020B0604020202020204" pitchFamily="34" charset="0"/>
-              </a:rPr>
-              <a:t>1</a:t>
-            </a:r>
-            <a:r>
-              <a:rPr lang="en-AU" dirty="0">
-                <a:effectLst/>
-                <a:latin typeface="Arial" panose="020B0604020202020204" pitchFamily="34" charset="0"/>
-                <a:cs typeface="Arial" panose="020B0604020202020204" pitchFamily="34" charset="0"/>
-              </a:rPr>
-              <a:t> </a:t>
-            </a:r>
-          </a:p>
-          <a:p>
-            <a:r>
-              <a:rPr lang="en-AU" dirty="0">
-                <a:effectLst/>
-                <a:latin typeface="Arial" panose="020B0604020202020204" pitchFamily="34" charset="0"/>
-                <a:cs typeface="Arial" panose="020B0604020202020204" pitchFamily="34" charset="0"/>
-              </a:rPr>
-              <a:t>CIA is sometimes extended to include Authentication, Accountability, Non-Repudiation and Reliability</a:t>
-            </a:r>
-            <a:endParaRPr lang="en-AU" dirty="0">
-              <a:latin typeface="Arial" panose="020B0604020202020204" pitchFamily="34" charset="0"/>
-              <a:cs typeface="Arial" panose="020B0604020202020204" pitchFamily="34" charset="0"/>
-            </a:endParaRPr>
-          </a:p>
-          <a:p>
-            <a:endParaRPr lang="en-AU" dirty="0">
-              <a:latin typeface="Arial" panose="020B0604020202020204" pitchFamily="34" charset="0"/>
-              <a:cs typeface="Arial" panose="020B0604020202020204" pitchFamily="34" charset="0"/>
-            </a:endParaRPr>
+              <a:rPr lang="en-US" sz="2000" dirty="0">
+                <a:solidFill>
+                  <a:srgbClr val="2B95D5"/>
+                </a:solidFill>
+              </a:rPr>
+              <a:t>2018 breaches</a:t>
+            </a:r>
+          </a:p>
+        </p:txBody>
+      </p:sp>
+      <p:sp>
+        <p:nvSpPr>
+          <p:cNvPr id="29" name="Rectangle 28">
+            <a:extLst>
+              <a:ext uri="{FF2B5EF4-FFF2-40B4-BE49-F238E27FC236}">
+                <a16:creationId xmlns:a16="http://schemas.microsoft.com/office/drawing/2014/main" id="{A6D87845-294F-40CB-BC48-46455460D292}"/>
+              </a:ext>
+              <a:ext uri="{C183D7F6-B498-43B3-948B-1728B52AA6E4}">
+                <adec:decorative xmlns:adec="http://schemas.microsoft.com/office/drawing/2017/decorative" val="1"/>
+              </a:ext>
+            </a:extLst>
+          </p:cNvPr>
+          <p:cNvSpPr>
+            <a:spLocks noGrp="1" noRot="1" noChangeAspect="1" noMove="1" noResize="1" noEditPoints="1" noAdjustHandles="1" noChangeArrowheads="1" noChangeShapeType="1" noTextEdit="1"/>
+          </p:cNvSpPr>
+          <p:nvPr>
+            <p:extLst>
+              <p:ext uri="{386F3935-93C4-4BCD-93E2-E3B085C9AB24}">
+                <p16:designElem xmlns:p16="http://schemas.microsoft.com/office/powerpoint/2015/main" val="1"/>
+              </p:ext>
+            </p:extLst>
+          </p:nvPr>
+        </p:nvSpPr>
+        <p:spPr>
+          <a:xfrm>
+            <a:off x="4655671" y="0"/>
+            <a:ext cx="7536329" cy="6858000"/>
+          </a:xfrm>
+          <a:prstGeom prst="rect">
+            <a:avLst/>
+          </a:prstGeom>
+          <a:solidFill>
+            <a:schemeClr val="tx1"/>
+          </a:solidFill>
+          <a:ln>
+            <a:noFill/>
+          </a:ln>
+        </p:spPr>
+        <p:style>
+          <a:lnRef idx="2">
+            <a:schemeClr val="accent1">
+              <a:shade val="50000"/>
+            </a:schemeClr>
+          </a:lnRef>
+          <a:fillRef idx="1">
+            <a:schemeClr val="accent1"/>
+          </a:fillRef>
+          <a:effectRef idx="0">
+            <a:schemeClr val="accent1"/>
+          </a:effectRef>
+          <a:fontRef idx="minor">
+            <a:schemeClr val="lt1"/>
+          </a:fontRef>
+        </p:style>
+        <p:txBody>
+          <a:bodyPr rtlCol="0" anchor="ctr"/>
+          <a:lstStyle/>
+          <a:p>
+            <a:pPr algn="ctr"/>
+            <a:endParaRPr lang="en-US"/>
+          </a:p>
+        </p:txBody>
+      </p:sp>
+      <p:pic>
+        <p:nvPicPr>
+          <p:cNvPr id="8" name="Content Placeholder 7" descr="A screenshot of a cell phone&#10;&#10;Description automatically generated">
+            <a:extLst>
+              <a:ext uri="{FF2B5EF4-FFF2-40B4-BE49-F238E27FC236}">
+                <a16:creationId xmlns:a16="http://schemas.microsoft.com/office/drawing/2014/main" id="{D9C8E697-C622-BD44-BD2B-AFCE759D3EB8}"/>
+              </a:ext>
+            </a:extLst>
+          </p:cNvPr>
+          <p:cNvPicPr>
+            <a:picLocks noChangeAspect="1"/>
+          </p:cNvPicPr>
+          <p:nvPr/>
+        </p:nvPicPr>
+        <p:blipFill>
+          <a:blip r:embed="rId4"/>
+          <a:stretch>
+            <a:fillRect/>
+          </a:stretch>
+        </p:blipFill>
+        <p:spPr>
+          <a:xfrm>
+            <a:off x="6139435" y="609600"/>
+            <a:ext cx="4567427" cy="5638800"/>
+          </a:xfrm>
+          <a:prstGeom prst="rect">
+            <a:avLst/>
+          </a:prstGeom>
+        </p:spPr>
+      </p:pic>
+      <p:sp>
+        <p:nvSpPr>
+          <p:cNvPr id="4" name="Footer Placeholder 3">
+            <a:extLst>
+              <a:ext uri="{FF2B5EF4-FFF2-40B4-BE49-F238E27FC236}">
+                <a16:creationId xmlns:a16="http://schemas.microsoft.com/office/drawing/2014/main" id="{5293465A-4C2A-754E-8F5A-63A08A730A0E}"/>
+              </a:ext>
+            </a:extLst>
+          </p:cNvPr>
+          <p:cNvSpPr>
+            <a:spLocks noGrp="1"/>
+          </p:cNvSpPr>
+          <p:nvPr>
+            <p:ph type="ftr" sz="quarter" idx="11"/>
+          </p:nvPr>
+        </p:nvSpPr>
+        <p:spPr>
+          <a:xfrm>
+            <a:off x="913795" y="6310313"/>
+            <a:ext cx="6672865" cy="365125"/>
+          </a:xfrm>
+        </p:spPr>
+        <p:txBody>
+          <a:bodyPr vert="horz" lIns="91440" tIns="45720" rIns="91440" bIns="45720" rtlCol="0" anchor="ctr">
+            <a:normAutofit/>
+          </a:bodyPr>
+          <a:lstStyle/>
+          <a:p>
+            <a:pPr>
+              <a:lnSpc>
+                <a:spcPct val="90000"/>
+              </a:lnSpc>
+              <a:spcAft>
+                <a:spcPts val="600"/>
+              </a:spcAft>
+            </a:pPr>
+            <a:r>
+              <a:rPr lang="en-US" sz="700" kern="1200">
+                <a:solidFill>
+                  <a:schemeClr val="tx1">
+                    <a:lumMod val="95000"/>
+                  </a:schemeClr>
+                </a:solidFill>
+                <a:effectLst>
+                  <a:outerShdw blurRad="50800" dist="38100" dir="2700000" algn="tl" rotWithShape="0">
+                    <a:schemeClr val="bg1">
+                      <a:alpha val="43000"/>
+                    </a:schemeClr>
+                  </a:outerShdw>
+                </a:effectLst>
+                <a:latin typeface="+mn-lt"/>
+                <a:ea typeface="+mn-ea"/>
+                <a:cs typeface="+mn-cs"/>
+              </a:rPr>
+              <a:t>2018 Verizon DBIR </a:t>
+            </a:r>
+          </a:p>
+          <a:p>
+            <a:pPr>
+              <a:lnSpc>
+                <a:spcPct val="90000"/>
+              </a:lnSpc>
+              <a:spcAft>
+                <a:spcPts val="600"/>
+              </a:spcAft>
+            </a:pPr>
+            <a:r>
+              <a:rPr lang="en-US" sz="700" kern="1200">
+                <a:solidFill>
+                  <a:schemeClr val="tx1">
+                    <a:lumMod val="95000"/>
+                  </a:schemeClr>
+                </a:solidFill>
+                <a:effectLst>
+                  <a:outerShdw blurRad="50800" dist="38100" dir="2700000" algn="tl" rotWithShape="0">
+                    <a:schemeClr val="bg1">
+                      <a:alpha val="43000"/>
+                    </a:schemeClr>
+                  </a:outerShdw>
+                </a:effectLst>
+                <a:latin typeface="+mn-lt"/>
+                <a:ea typeface="+mn-ea"/>
+                <a:cs typeface="+mn-cs"/>
+              </a:rPr>
+              <a:t>https://enterprise.verizon.com/resources/executivebriefs/2019-dbir-executive-brief.pdf</a:t>
+            </a:r>
           </a:p>
         </p:txBody>
       </p:sp>
     </p:spTree>
     <p:extLst>
       <p:ext uri="{BB962C8B-B14F-4D97-AF65-F5344CB8AC3E}">
-        <p14:creationId xmlns:p14="http://schemas.microsoft.com/office/powerpoint/2010/main" val="2850690858"/>
+        <p14:creationId xmlns:p14="http://schemas.microsoft.com/office/powerpoint/2010/main" val="3235645542"/>
       </p:ext>
     </p:extLst>
   </p:cSld>
@@ -16612,375 +16798,6 @@
       </p:grpSpPr>
       <p:sp useBgFill="1">
         <p:nvSpPr>
-          <p:cNvPr id="27" name="Rectangle 26">
-            <a:extLst>
-              <a:ext uri="{FF2B5EF4-FFF2-40B4-BE49-F238E27FC236}">
-                <a16:creationId xmlns:a16="http://schemas.microsoft.com/office/drawing/2014/main" id="{1E70A317-DCED-4E80-AA2D-467D8702E5CB}"/>
-              </a:ext>
-              <a:ext uri="{C183D7F6-B498-43B3-948B-1728B52AA6E4}">
-                <adec:decorative xmlns:adec="http://schemas.microsoft.com/office/drawing/2017/decorative" val="1"/>
-              </a:ext>
-            </a:extLst>
-          </p:cNvPr>
-          <p:cNvSpPr>
-            <a:spLocks noGrp="1" noRot="1" noChangeAspect="1" noMove="1" noResize="1" noEditPoints="1" noAdjustHandles="1" noChangeArrowheads="1" noChangeShapeType="1" noTextEdit="1"/>
-          </p:cNvSpPr>
-          <p:nvPr>
-            <p:extLst>
-              <p:ext uri="{386F3935-93C4-4BCD-93E2-E3B085C9AB24}">
-                <p16:designElem xmlns:p16="http://schemas.microsoft.com/office/powerpoint/2015/main" val="1"/>
-              </p:ext>
-            </p:extLst>
-          </p:nvPr>
-        </p:nvSpPr>
-        <p:spPr>
-          <a:xfrm>
-            <a:off x="0" y="0"/>
-            <a:ext cx="12192000" cy="6858000"/>
-          </a:xfrm>
-          <a:prstGeom prst="rect">
-            <a:avLst/>
-          </a:prstGeom>
-          <a:ln>
-            <a:noFill/>
-          </a:ln>
-        </p:spPr>
-        <p:style>
-          <a:lnRef idx="2">
-            <a:schemeClr val="accent1">
-              <a:shade val="50000"/>
-            </a:schemeClr>
-          </a:lnRef>
-          <a:fillRef idx="1">
-            <a:schemeClr val="accent1"/>
-          </a:fillRef>
-          <a:effectRef idx="0">
-            <a:schemeClr val="accent1"/>
-          </a:effectRef>
-          <a:fontRef idx="minor">
-            <a:schemeClr val="lt1"/>
-          </a:fontRef>
-        </p:style>
-        <p:txBody>
-          <a:bodyPr rtlCol="0" anchor="ctr"/>
-          <a:lstStyle/>
-          <a:p>
-            <a:pPr algn="ctr"/>
-            <a:endParaRPr lang="en-US"/>
-          </a:p>
-        </p:txBody>
-      </p:sp>
-      <p:sp>
-        <p:nvSpPr>
-          <p:cNvPr id="2" name="Title 1">
-            <a:extLst>
-              <a:ext uri="{FF2B5EF4-FFF2-40B4-BE49-F238E27FC236}">
-                <a16:creationId xmlns:a16="http://schemas.microsoft.com/office/drawing/2014/main" id="{5C4F01C5-5333-2248-B03B-703C97F7CC69}"/>
-              </a:ext>
-            </a:extLst>
-          </p:cNvPr>
-          <p:cNvSpPr>
-            <a:spLocks noGrp="1"/>
-          </p:cNvSpPr>
-          <p:nvPr>
-            <p:ph type="title"/>
-          </p:nvPr>
-        </p:nvSpPr>
-        <p:spPr>
-          <a:xfrm>
-            <a:off x="861791" y="835383"/>
-            <a:ext cx="3382832" cy="3499549"/>
-          </a:xfrm>
-        </p:spPr>
-        <p:txBody>
-          <a:bodyPr vert="horz" lIns="91440" tIns="45720" rIns="91440" bIns="45720" rtlCol="0" anchor="b">
-            <a:normAutofit/>
-          </a:bodyPr>
-          <a:lstStyle/>
-          <a:p>
-            <a:pPr algn="l"/>
-            <a:r>
-              <a:rPr lang="en-US" sz="4200" dirty="0"/>
-              <a:t>Human Threats</a:t>
-            </a:r>
-          </a:p>
-        </p:txBody>
-      </p:sp>
-      <p:sp>
-        <p:nvSpPr>
-          <p:cNvPr id="19" name="Content Placeholder 18">
-            <a:extLst>
-              <a:ext uri="{FF2B5EF4-FFF2-40B4-BE49-F238E27FC236}">
-                <a16:creationId xmlns:a16="http://schemas.microsoft.com/office/drawing/2014/main" id="{F6948037-86E0-421A-B96C-F87438C98CFD}"/>
-              </a:ext>
-            </a:extLst>
-          </p:cNvPr>
-          <p:cNvSpPr>
-            <a:spLocks noGrp="1"/>
-          </p:cNvSpPr>
-          <p:nvPr>
-            <p:ph idx="1"/>
-          </p:nvPr>
-        </p:nvSpPr>
-        <p:spPr>
-          <a:xfrm>
-            <a:off x="861789" y="4334933"/>
-            <a:ext cx="3382831" cy="1185333"/>
-          </a:xfrm>
-        </p:spPr>
-        <p:txBody>
-          <a:bodyPr vert="horz" lIns="91440" tIns="45720" rIns="91440" bIns="45720" rtlCol="0" anchor="t">
-            <a:normAutofit/>
-          </a:bodyPr>
-          <a:lstStyle/>
-          <a:p>
-            <a:pPr marL="0" indent="0">
-              <a:buNone/>
-            </a:pPr>
-            <a:r>
-              <a:rPr lang="en-US" sz="2000" dirty="0">
-                <a:solidFill>
-                  <a:srgbClr val="2B95D5"/>
-                </a:solidFill>
-              </a:rPr>
-              <a:t>2018 breaches</a:t>
-            </a:r>
-          </a:p>
-        </p:txBody>
-      </p:sp>
-      <p:sp>
-        <p:nvSpPr>
-          <p:cNvPr id="29" name="Rectangle 28">
-            <a:extLst>
-              <a:ext uri="{FF2B5EF4-FFF2-40B4-BE49-F238E27FC236}">
-                <a16:creationId xmlns:a16="http://schemas.microsoft.com/office/drawing/2014/main" id="{A6D87845-294F-40CB-BC48-46455460D292}"/>
-              </a:ext>
-              <a:ext uri="{C183D7F6-B498-43B3-948B-1728B52AA6E4}">
-                <adec:decorative xmlns:adec="http://schemas.microsoft.com/office/drawing/2017/decorative" val="1"/>
-              </a:ext>
-            </a:extLst>
-          </p:cNvPr>
-          <p:cNvSpPr>
-            <a:spLocks noGrp="1" noRot="1" noChangeAspect="1" noMove="1" noResize="1" noEditPoints="1" noAdjustHandles="1" noChangeArrowheads="1" noChangeShapeType="1" noTextEdit="1"/>
-          </p:cNvSpPr>
-          <p:nvPr>
-            <p:extLst>
-              <p:ext uri="{386F3935-93C4-4BCD-93E2-E3B085C9AB24}">
-                <p16:designElem xmlns:p16="http://schemas.microsoft.com/office/powerpoint/2015/main" val="1"/>
-              </p:ext>
-            </p:extLst>
-          </p:nvPr>
-        </p:nvSpPr>
-        <p:spPr>
-          <a:xfrm>
-            <a:off x="4655671" y="0"/>
-            <a:ext cx="7536329" cy="6858000"/>
-          </a:xfrm>
-          <a:prstGeom prst="rect">
-            <a:avLst/>
-          </a:prstGeom>
-          <a:solidFill>
-            <a:schemeClr val="tx1"/>
-          </a:solidFill>
-          <a:ln>
-            <a:noFill/>
-          </a:ln>
-        </p:spPr>
-        <p:style>
-          <a:lnRef idx="2">
-            <a:schemeClr val="accent1">
-              <a:shade val="50000"/>
-            </a:schemeClr>
-          </a:lnRef>
-          <a:fillRef idx="1">
-            <a:schemeClr val="accent1"/>
-          </a:fillRef>
-          <a:effectRef idx="0">
-            <a:schemeClr val="accent1"/>
-          </a:effectRef>
-          <a:fontRef idx="minor">
-            <a:schemeClr val="lt1"/>
-          </a:fontRef>
-        </p:style>
-        <p:txBody>
-          <a:bodyPr rtlCol="0" anchor="ctr"/>
-          <a:lstStyle/>
-          <a:p>
-            <a:pPr algn="ctr"/>
-            <a:endParaRPr lang="en-US"/>
-          </a:p>
-        </p:txBody>
-      </p:sp>
-      <p:pic>
-        <p:nvPicPr>
-          <p:cNvPr id="8" name="Content Placeholder 7" descr="A screenshot of a cell phone&#10;&#10;Description automatically generated">
-            <a:extLst>
-              <a:ext uri="{FF2B5EF4-FFF2-40B4-BE49-F238E27FC236}">
-                <a16:creationId xmlns:a16="http://schemas.microsoft.com/office/drawing/2014/main" id="{D9C8E697-C622-BD44-BD2B-AFCE759D3EB8}"/>
-              </a:ext>
-            </a:extLst>
-          </p:cNvPr>
-          <p:cNvPicPr>
-            <a:picLocks noChangeAspect="1"/>
-          </p:cNvPicPr>
-          <p:nvPr/>
-        </p:nvPicPr>
-        <p:blipFill>
-          <a:blip r:embed="rId4"/>
-          <a:stretch>
-            <a:fillRect/>
-          </a:stretch>
-        </p:blipFill>
-        <p:spPr>
-          <a:xfrm>
-            <a:off x="6139435" y="609600"/>
-            <a:ext cx="4567427" cy="5638800"/>
-          </a:xfrm>
-          <a:prstGeom prst="rect">
-            <a:avLst/>
-          </a:prstGeom>
-        </p:spPr>
-      </p:pic>
-      <p:sp>
-        <p:nvSpPr>
-          <p:cNvPr id="4" name="Footer Placeholder 3">
-            <a:extLst>
-              <a:ext uri="{FF2B5EF4-FFF2-40B4-BE49-F238E27FC236}">
-                <a16:creationId xmlns:a16="http://schemas.microsoft.com/office/drawing/2014/main" id="{5293465A-4C2A-754E-8F5A-63A08A730A0E}"/>
-              </a:ext>
-            </a:extLst>
-          </p:cNvPr>
-          <p:cNvSpPr>
-            <a:spLocks noGrp="1"/>
-          </p:cNvSpPr>
-          <p:nvPr>
-            <p:ph type="ftr" sz="quarter" idx="11"/>
-          </p:nvPr>
-        </p:nvSpPr>
-        <p:spPr>
-          <a:xfrm>
-            <a:off x="913795" y="6310313"/>
-            <a:ext cx="6672865" cy="365125"/>
-          </a:xfrm>
-        </p:spPr>
-        <p:txBody>
-          <a:bodyPr vert="horz" lIns="91440" tIns="45720" rIns="91440" bIns="45720" rtlCol="0" anchor="ctr">
-            <a:normAutofit/>
-          </a:bodyPr>
-          <a:lstStyle/>
-          <a:p>
-            <a:pPr>
-              <a:lnSpc>
-                <a:spcPct val="90000"/>
-              </a:lnSpc>
-              <a:spcAft>
-                <a:spcPts val="600"/>
-              </a:spcAft>
-            </a:pPr>
-            <a:r>
-              <a:rPr lang="en-US" sz="700" kern="1200">
-                <a:solidFill>
-                  <a:schemeClr val="tx1">
-                    <a:lumMod val="95000"/>
-                  </a:schemeClr>
-                </a:solidFill>
-                <a:effectLst>
-                  <a:outerShdw blurRad="50800" dist="38100" dir="2700000" algn="tl" rotWithShape="0">
-                    <a:schemeClr val="bg1">
-                      <a:alpha val="43000"/>
-                    </a:schemeClr>
-                  </a:outerShdw>
-                </a:effectLst>
-                <a:latin typeface="+mn-lt"/>
-                <a:ea typeface="+mn-ea"/>
-                <a:cs typeface="+mn-cs"/>
-              </a:rPr>
-              <a:t>2018 Verizon DBIR </a:t>
-            </a:r>
-          </a:p>
-          <a:p>
-            <a:pPr>
-              <a:lnSpc>
-                <a:spcPct val="90000"/>
-              </a:lnSpc>
-              <a:spcAft>
-                <a:spcPts val="600"/>
-              </a:spcAft>
-            </a:pPr>
-            <a:r>
-              <a:rPr lang="en-US" sz="700" kern="1200">
-                <a:solidFill>
-                  <a:schemeClr val="tx1">
-                    <a:lumMod val="95000"/>
-                  </a:schemeClr>
-                </a:solidFill>
-                <a:effectLst>
-                  <a:outerShdw blurRad="50800" dist="38100" dir="2700000" algn="tl" rotWithShape="0">
-                    <a:schemeClr val="bg1">
-                      <a:alpha val="43000"/>
-                    </a:schemeClr>
-                  </a:outerShdw>
-                </a:effectLst>
-                <a:latin typeface="+mn-lt"/>
-                <a:ea typeface="+mn-ea"/>
-                <a:cs typeface="+mn-cs"/>
-              </a:rPr>
-              <a:t>https://enterprise.verizon.com/resources/executivebriefs/2019-dbir-executive-brief.pdf</a:t>
-            </a:r>
-          </a:p>
-        </p:txBody>
-      </p:sp>
-    </p:spTree>
-    <p:extLst>
-      <p:ext uri="{BB962C8B-B14F-4D97-AF65-F5344CB8AC3E}">
-        <p14:creationId xmlns:p14="http://schemas.microsoft.com/office/powerpoint/2010/main" val="3235645542"/>
-      </p:ext>
-    </p:extLst>
-  </p:cSld>
-  <p:clrMapOvr>
-    <a:masterClrMapping/>
-  </p:clrMapOvr>
-</p:sld>
-</file>
-
-<file path=ppt/slides/slide25.xml><?xml version="1.0" encoding="utf-8"?>
-<p:sld xmlns:a="http://schemas.openxmlformats.org/drawingml/2006/main" xmlns:r="http://schemas.openxmlformats.org/officeDocument/2006/relationships" xmlns:p="http://schemas.openxmlformats.org/presentationml/2006/main">
-  <p:cSld>
-    <p:bg>
-      <p:bgPr>
-        <a:blipFill rotWithShape="1">
-          <a:blip r:embed="rId3">
-            <a:duotone>
-              <a:schemeClr val="bg1">
-                <a:shade val="80000"/>
-                <a:lumMod val="80000"/>
-              </a:schemeClr>
-              <a:schemeClr val="bg1">
-                <a:tint val="98000"/>
-              </a:schemeClr>
-            </a:duotone>
-          </a:blip>
-          <a:stretch/>
-        </a:blipFill>
-        <a:effectLst/>
-      </p:bgPr>
-    </p:bg>
-    <p:spTree>
-      <p:nvGrpSpPr>
-        <p:cNvPr id="1" name=""/>
-        <p:cNvGrpSpPr/>
-        <p:nvPr/>
-      </p:nvGrpSpPr>
-      <p:grpSpPr>
-        <a:xfrm>
-          <a:off x="0" y="0"/>
-          <a:ext cx="0" cy="0"/>
-          <a:chOff x="0" y="0"/>
-          <a:chExt cx="0" cy="0"/>
-        </a:xfrm>
-      </p:grpSpPr>
-      <p:sp useBgFill="1">
-        <p:nvSpPr>
           <p:cNvPr id="38" name="Rectangle 33">
             <a:extLst>
               <a:ext uri="{FF2B5EF4-FFF2-40B4-BE49-F238E27FC236}">
@@ -17312,6 +17129,203 @@
 </p:sld>
 </file>
 
+<file path=ppt/slides/slide25.xml><?xml version="1.0" encoding="utf-8"?>
+<p:sld xmlns:a="http://schemas.openxmlformats.org/drawingml/2006/main" xmlns:r="http://schemas.openxmlformats.org/officeDocument/2006/relationships" xmlns:p="http://schemas.openxmlformats.org/presentationml/2006/main">
+  <p:cSld>
+    <p:spTree>
+      <p:nvGrpSpPr>
+        <p:cNvPr id="1" name=""/>
+        <p:cNvGrpSpPr/>
+        <p:nvPr/>
+      </p:nvGrpSpPr>
+      <p:grpSpPr>
+        <a:xfrm>
+          <a:off x="0" y="0"/>
+          <a:ext cx="0" cy="0"/>
+          <a:chOff x="0" y="0"/>
+          <a:chExt cx="0" cy="0"/>
+        </a:xfrm>
+      </p:grpSpPr>
+      <p:sp>
+        <p:nvSpPr>
+          <p:cNvPr id="2" name="Title 1">
+            <a:extLst>
+              <a:ext uri="{FF2B5EF4-FFF2-40B4-BE49-F238E27FC236}">
+                <a16:creationId xmlns:a16="http://schemas.microsoft.com/office/drawing/2014/main" id="{5C4F01C5-5333-2248-B03B-703C97F7CC69}"/>
+              </a:ext>
+            </a:extLst>
+          </p:cNvPr>
+          <p:cNvSpPr>
+            <a:spLocks noGrp="1"/>
+          </p:cNvSpPr>
+          <p:nvPr>
+            <p:ph type="title"/>
+          </p:nvPr>
+        </p:nvSpPr>
+        <p:spPr/>
+        <p:txBody>
+          <a:bodyPr/>
+          <a:lstStyle/>
+          <a:p>
+            <a:r>
+              <a:rPr lang="en-AU" dirty="0"/>
+              <a:t>Learning Outcomes</a:t>
+            </a:r>
+          </a:p>
+        </p:txBody>
+      </p:sp>
+      <p:sp>
+        <p:nvSpPr>
+          <p:cNvPr id="3" name="Content Placeholder 2">
+            <a:extLst>
+              <a:ext uri="{FF2B5EF4-FFF2-40B4-BE49-F238E27FC236}">
+                <a16:creationId xmlns:a16="http://schemas.microsoft.com/office/drawing/2014/main" id="{F7DD7DCB-C7E2-1B4F-BD83-3B7AF005DD76}"/>
+              </a:ext>
+            </a:extLst>
+          </p:cNvPr>
+          <p:cNvSpPr>
+            <a:spLocks noGrp="1"/>
+          </p:cNvSpPr>
+          <p:nvPr>
+            <p:ph idx="1"/>
+          </p:nvPr>
+        </p:nvSpPr>
+        <p:spPr>
+          <a:xfrm>
+            <a:off x="913795" y="2076450"/>
+            <a:ext cx="10353762" cy="3924299"/>
+          </a:xfrm>
+        </p:spPr>
+        <p:txBody>
+          <a:bodyPr>
+            <a:normAutofit lnSpcReduction="10000"/>
+          </a:bodyPr>
+          <a:lstStyle/>
+          <a:p>
+            <a:r>
+              <a:rPr lang="en-GB" dirty="0">
+                <a:effectLst/>
+                <a:latin typeface="Arial" panose="020B0604020202020204" pitchFamily="34" charset="0"/>
+                <a:cs typeface="Arial" panose="020B0604020202020204" pitchFamily="34" charset="0"/>
+              </a:rPr>
+              <a:t>To understand and be able to articulate</a:t>
+            </a:r>
+          </a:p>
+          <a:p>
+            <a:pPr lvl="1"/>
+            <a:r>
+              <a:rPr lang="en-GB" dirty="0">
+                <a:effectLst/>
+                <a:latin typeface="Arial" panose="020B0604020202020204" pitchFamily="34" charset="0"/>
+                <a:cs typeface="Arial" panose="020B0604020202020204" pitchFamily="34" charset="0"/>
+              </a:rPr>
+              <a:t>The language of Cybersecurity</a:t>
+            </a:r>
+          </a:p>
+          <a:p>
+            <a:pPr lvl="1"/>
+            <a:r>
+              <a:rPr lang="en-GB" dirty="0">
+                <a:effectLst/>
+                <a:latin typeface="Arial" panose="020B0604020202020204" pitchFamily="34" charset="0"/>
+                <a:cs typeface="Arial" panose="020B0604020202020204" pitchFamily="34" charset="0"/>
+              </a:rPr>
+              <a:t>The principles of preserving Confidentiality, Integrity and Availability</a:t>
+            </a:r>
+          </a:p>
+          <a:p>
+            <a:pPr lvl="1"/>
+            <a:r>
+              <a:rPr lang="en-GB" dirty="0">
+                <a:effectLst/>
+                <a:latin typeface="Arial" panose="020B0604020202020204" pitchFamily="34" charset="0"/>
+                <a:cs typeface="Arial" panose="020B0604020202020204" pitchFamily="34" charset="0"/>
+              </a:rPr>
+              <a:t>Principles of Risk Management</a:t>
+            </a:r>
+          </a:p>
+          <a:p>
+            <a:pPr lvl="1"/>
+            <a:r>
+              <a:rPr lang="en-GB" dirty="0">
+                <a:effectLst/>
+                <a:latin typeface="Arial" panose="020B0604020202020204" pitchFamily="34" charset="0"/>
+                <a:cs typeface="Arial" panose="020B0604020202020204" pitchFamily="34" charset="0"/>
+              </a:rPr>
+              <a:t>Cybersecurity in the domains of </a:t>
+            </a:r>
+          </a:p>
+          <a:p>
+            <a:pPr lvl="2"/>
+            <a:r>
+              <a:rPr lang="en-GB" dirty="0">
+                <a:effectLst/>
+                <a:latin typeface="Arial" panose="020B0604020202020204" pitchFamily="34" charset="0"/>
+                <a:cs typeface="Arial" panose="020B0604020202020204" pitchFamily="34" charset="0"/>
+              </a:rPr>
+              <a:t>* Human organisational and regulatory aspects, * Attacks and Defences, * System Security, * Software and Platform Security, * Infrastructure Security</a:t>
+            </a:r>
+          </a:p>
+          <a:p>
+            <a:r>
+              <a:rPr lang="en-GB" dirty="0">
+                <a:effectLst/>
+                <a:latin typeface="Arial" panose="020B0604020202020204" pitchFamily="34" charset="0"/>
+                <a:cs typeface="Arial" panose="020B0604020202020204" pitchFamily="34" charset="0"/>
+              </a:rPr>
+              <a:t>Case studies will be used to illustrate and concretise language, terms and concepts throughout the live lectures</a:t>
+            </a:r>
+          </a:p>
+          <a:p>
+            <a:r>
+              <a:rPr lang="en-GB" dirty="0">
+                <a:effectLst/>
+                <a:latin typeface="Arial" panose="020B0604020202020204" pitchFamily="34" charset="0"/>
+                <a:cs typeface="Arial" panose="020B0604020202020204" pitchFamily="34" charset="0"/>
+              </a:rPr>
+              <a:t>Practical laboratory work will assist in practical aspects of Cybersecurity</a:t>
+            </a:r>
+          </a:p>
+        </p:txBody>
+      </p:sp>
+      <p:sp>
+        <p:nvSpPr>
+          <p:cNvPr id="4" name="Footer Placeholder 3">
+            <a:extLst>
+              <a:ext uri="{FF2B5EF4-FFF2-40B4-BE49-F238E27FC236}">
+                <a16:creationId xmlns:a16="http://schemas.microsoft.com/office/drawing/2014/main" id="{5293465A-4C2A-754E-8F5A-63A08A730A0E}"/>
+              </a:ext>
+            </a:extLst>
+          </p:cNvPr>
+          <p:cNvSpPr>
+            <a:spLocks noGrp="1"/>
+          </p:cNvSpPr>
+          <p:nvPr>
+            <p:ph type="ftr" sz="quarter" idx="11"/>
+          </p:nvPr>
+        </p:nvSpPr>
+        <p:spPr/>
+        <p:txBody>
+          <a:bodyPr/>
+          <a:lstStyle/>
+          <a:p>
+            <a:endParaRPr lang="en-US" dirty="0"/>
+          </a:p>
+        </p:txBody>
+      </p:sp>
+    </p:spTree>
+    <p:extLst>
+      <p:ext uri="{BB962C8B-B14F-4D97-AF65-F5344CB8AC3E}">
+        <p14:creationId xmlns:p14="http://schemas.microsoft.com/office/powerpoint/2010/main" val="1068746973"/>
+      </p:ext>
+    </p:extLst>
+  </p:cSld>
+  <p:clrMapOvr>
+    <a:masterClrMapping/>
+  </p:clrMapOvr>
+</p:sld>
+</file>
+
 <file path=ppt/slides/slide26.xml><?xml version="1.0" encoding="utf-8"?>
 <p:sld xmlns:a="http://schemas.openxmlformats.org/drawingml/2006/main" xmlns:r="http://schemas.openxmlformats.org/officeDocument/2006/relationships" xmlns:p="http://schemas.openxmlformats.org/presentationml/2006/main">
   <p:cSld>
@@ -17334,7 +17348,7 @@
           <p:cNvPr id="2" name="Title 1">
             <a:extLst>
               <a:ext uri="{FF2B5EF4-FFF2-40B4-BE49-F238E27FC236}">
-                <a16:creationId xmlns:a16="http://schemas.microsoft.com/office/drawing/2014/main" id="{5C4F01C5-5333-2248-B03B-703C97F7CC69}"/>
+                <a16:creationId xmlns:a16="http://schemas.microsoft.com/office/drawing/2014/main" id="{F504D983-BF7D-9343-B99F-81DCAC39D19B}"/>
               </a:ext>
             </a:extLst>
           </p:cNvPr>
@@ -17352,7 +17366,14 @@
           <a:p>
             <a:r>
               <a:rPr lang="en-AU" dirty="0"/>
-              <a:t>Learning Outcomes</a:t>
+              <a:t>Ethics</a:t>
+            </a:r>
+            <a:br>
+              <a:rPr lang="en-AU" dirty="0"/>
+            </a:br>
+            <a:r>
+              <a:rPr lang="en-AU" dirty="0"/>
+              <a:t>(or what you *absolutely* should not do)</a:t>
             </a:r>
           </a:p>
         </p:txBody>
@@ -17362,7 +17383,7 @@
           <p:cNvPr id="3" name="Content Placeholder 2">
             <a:extLst>
               <a:ext uri="{FF2B5EF4-FFF2-40B4-BE49-F238E27FC236}">
-                <a16:creationId xmlns:a16="http://schemas.microsoft.com/office/drawing/2014/main" id="{F7DD7DCB-C7E2-1B4F-BD83-3B7AF005DD76}"/>
+                <a16:creationId xmlns:a16="http://schemas.microsoft.com/office/drawing/2014/main" id="{BBEA6D1A-7BEE-D443-9695-FB4C23725F4D}"/>
               </a:ext>
             </a:extLst>
           </p:cNvPr>
@@ -17376,130 +17397,102 @@
         <p:spPr>
           <a:xfrm>
             <a:off x="913795" y="2076450"/>
-            <a:ext cx="10353762" cy="3924299"/>
+            <a:ext cx="10353762" cy="4384508"/>
           </a:xfrm>
         </p:spPr>
         <p:txBody>
           <a:bodyPr>
-            <a:normAutofit lnSpcReduction="10000"/>
+            <a:normAutofit/>
           </a:bodyPr>
           <a:lstStyle/>
           <a:p>
             <a:r>
-              <a:rPr lang="en-GB" dirty="0">
-                <a:effectLst/>
+              <a:rPr lang="en-AU" dirty="0">
                 <a:latin typeface="Arial" panose="020B0604020202020204" pitchFamily="34" charset="0"/>
                 <a:cs typeface="Arial" panose="020B0604020202020204" pitchFamily="34" charset="0"/>
               </a:rPr>
-              <a:t>To understand and be able to articulate</a:t>
-            </a:r>
-          </a:p>
-          <a:p>
-            <a:pPr lvl="1"/>
-            <a:r>
-              <a:rPr lang="en-GB" dirty="0">
-                <a:effectLst/>
+              <a:t>Codes of Ethics are needed by all endeavours that are ”professions”. In cybersecurity, there are several organisations that have them</a:t>
+            </a:r>
+          </a:p>
+          <a:p>
+            <a:r>
+              <a:rPr lang="en-AU" dirty="0">
                 <a:latin typeface="Arial" panose="020B0604020202020204" pitchFamily="34" charset="0"/>
                 <a:cs typeface="Arial" panose="020B0604020202020204" pitchFamily="34" charset="0"/>
               </a:rPr>
-              <a:t>The language of Cybersecurity</a:t>
-            </a:r>
-          </a:p>
-          <a:p>
-            <a:pPr lvl="1"/>
-            <a:r>
-              <a:rPr lang="en-GB" dirty="0">
-                <a:effectLst/>
+              <a:t>ISC</a:t>
+            </a:r>
+            <a:r>
+              <a:rPr lang="en-AU" baseline="30000" dirty="0">
                 <a:latin typeface="Arial" panose="020B0604020202020204" pitchFamily="34" charset="0"/>
                 <a:cs typeface="Arial" panose="020B0604020202020204" pitchFamily="34" charset="0"/>
               </a:rPr>
-              <a:t>The principles of preserving Confidentiality, Integrity and Availability</a:t>
-            </a:r>
+              <a:t>2</a:t>
+            </a:r>
+            <a:endParaRPr lang="en-AU" baseline="30000" dirty="0">
+              <a:effectLst>
+                <a:outerShdw blurRad="38100" dist="38100" dir="2700000" algn="tl">
+                  <a:srgbClr val="000000">
+                    <a:alpha val="43137"/>
+                  </a:srgbClr>
+                </a:outerShdw>
+              </a:effectLst>
+              <a:latin typeface="Arial" panose="020B0604020202020204" pitchFamily="34" charset="0"/>
+              <a:cs typeface="Arial" panose="020B0604020202020204" pitchFamily="34" charset="0"/>
+            </a:endParaRPr>
           </a:p>
           <a:p>
             <a:pPr lvl="1"/>
             <a:r>
-              <a:rPr lang="en-GB" dirty="0">
-                <a:effectLst/>
+              <a:rPr lang="en-AU" dirty="0">
                 <a:latin typeface="Arial" panose="020B0604020202020204" pitchFamily="34" charset="0"/>
                 <a:cs typeface="Arial" panose="020B0604020202020204" pitchFamily="34" charset="0"/>
               </a:rPr>
-              <a:t>Principles of Risk Management</a:t>
+              <a:t>Protect society, the common good, necessary public trust and confidence, and the infrastructure. </a:t>
             </a:r>
           </a:p>
           <a:p>
             <a:pPr lvl="1"/>
             <a:r>
-              <a:rPr lang="en-GB" dirty="0">
-                <a:effectLst/>
+              <a:rPr lang="en-AU" dirty="0">
                 <a:latin typeface="Arial" panose="020B0604020202020204" pitchFamily="34" charset="0"/>
                 <a:cs typeface="Arial" panose="020B0604020202020204" pitchFamily="34" charset="0"/>
               </a:rPr>
-              <a:t>Cybersecurity in the domains of </a:t>
-            </a:r>
-          </a:p>
-          <a:p>
-            <a:pPr lvl="2"/>
-            <a:r>
-              <a:rPr lang="en-GB" dirty="0">
-                <a:effectLst/>
+              <a:t>Act honourably, honestly, justly, responsibly, and legally. </a:t>
+            </a:r>
+          </a:p>
+          <a:p>
+            <a:pPr lvl="1"/>
+            <a:r>
+              <a:rPr lang="en-AU" dirty="0">
                 <a:latin typeface="Arial" panose="020B0604020202020204" pitchFamily="34" charset="0"/>
                 <a:cs typeface="Arial" panose="020B0604020202020204" pitchFamily="34" charset="0"/>
               </a:rPr>
-              <a:t>* Human organisational and regulatory aspects, * Attacks and Defences, * System Security, * Software and Platform Security, * Infrastructure Security</a:t>
-            </a:r>
-          </a:p>
-          <a:p>
-            <a:r>
-              <a:rPr lang="en-GB" dirty="0">
-                <a:effectLst/>
+              <a:t>Provide diligent and competent service to principals. </a:t>
+            </a:r>
+          </a:p>
+          <a:p>
+            <a:pPr lvl="1"/>
+            <a:r>
+              <a:rPr lang="en-AU" dirty="0">
                 <a:latin typeface="Arial" panose="020B0604020202020204" pitchFamily="34" charset="0"/>
                 <a:cs typeface="Arial" panose="020B0604020202020204" pitchFamily="34" charset="0"/>
               </a:rPr>
-              <a:t>Case studies will be used to illustrate and concretise language, terms and concepts throughout the live lectures</a:t>
-            </a:r>
-          </a:p>
-          <a:p>
-            <a:r>
-              <a:rPr lang="en-GB" dirty="0">
-                <a:effectLst/>
-                <a:latin typeface="Arial" panose="020B0604020202020204" pitchFamily="34" charset="0"/>
-                <a:cs typeface="Arial" panose="020B0604020202020204" pitchFamily="34" charset="0"/>
-              </a:rPr>
-              <a:t>Practical laboratory work will assist in practical aspects of Cybersecurity</a:t>
-            </a:r>
-          </a:p>
-        </p:txBody>
-      </p:sp>
-      <p:sp>
-        <p:nvSpPr>
-          <p:cNvPr id="4" name="Footer Placeholder 3">
-            <a:extLst>
-              <a:ext uri="{FF2B5EF4-FFF2-40B4-BE49-F238E27FC236}">
-                <a16:creationId xmlns:a16="http://schemas.microsoft.com/office/drawing/2014/main" id="{5293465A-4C2A-754E-8F5A-63A08A730A0E}"/>
-              </a:ext>
-            </a:extLst>
-          </p:cNvPr>
-          <p:cNvSpPr>
-            <a:spLocks noGrp="1"/>
-          </p:cNvSpPr>
-          <p:nvPr>
-            <p:ph type="ftr" sz="quarter" idx="11"/>
-          </p:nvPr>
-        </p:nvSpPr>
-        <p:spPr/>
-        <p:txBody>
-          <a:bodyPr/>
-          <a:lstStyle/>
-          <a:p>
-            <a:endParaRPr lang="en-US" dirty="0"/>
+              <a:t>Advance and protect the profession.</a:t>
+            </a:r>
+          </a:p>
+          <a:p>
+            <a:endParaRPr lang="en-AU" dirty="0">
+              <a:latin typeface="Arial" panose="020B0604020202020204" pitchFamily="34" charset="0"/>
+              <a:cs typeface="Arial" panose="020B0604020202020204" pitchFamily="34" charset="0"/>
+            </a:endParaRPr>
           </a:p>
         </p:txBody>
       </p:sp>
     </p:spTree>
     <p:extLst>
       <p:ext uri="{BB962C8B-B14F-4D97-AF65-F5344CB8AC3E}">
-        <p14:creationId xmlns:p14="http://schemas.microsoft.com/office/powerpoint/2010/main" val="1068746973"/>
+        <p14:creationId xmlns:p14="http://schemas.microsoft.com/office/powerpoint/2010/main" val="2805807811"/>
       </p:ext>
     </p:extLst>
   </p:cSld>
@@ -17531,182 +17524,6 @@
           <p:cNvPr id="2" name="Title 1">
             <a:extLst>
               <a:ext uri="{FF2B5EF4-FFF2-40B4-BE49-F238E27FC236}">
-                <a16:creationId xmlns:a16="http://schemas.microsoft.com/office/drawing/2014/main" id="{F504D983-BF7D-9343-B99F-81DCAC39D19B}"/>
-              </a:ext>
-            </a:extLst>
-          </p:cNvPr>
-          <p:cNvSpPr>
-            <a:spLocks noGrp="1"/>
-          </p:cNvSpPr>
-          <p:nvPr>
-            <p:ph type="title"/>
-          </p:nvPr>
-        </p:nvSpPr>
-        <p:spPr/>
-        <p:txBody>
-          <a:bodyPr/>
-          <a:lstStyle/>
-          <a:p>
-            <a:r>
-              <a:rPr lang="en-AU" dirty="0"/>
-              <a:t>Ethics</a:t>
-            </a:r>
-            <a:br>
-              <a:rPr lang="en-AU" dirty="0"/>
-            </a:br>
-            <a:r>
-              <a:rPr lang="en-AU" dirty="0"/>
-              <a:t>(or what you *absolutely* should not do)</a:t>
-            </a:r>
-          </a:p>
-        </p:txBody>
-      </p:sp>
-      <p:sp>
-        <p:nvSpPr>
-          <p:cNvPr id="3" name="Content Placeholder 2">
-            <a:extLst>
-              <a:ext uri="{FF2B5EF4-FFF2-40B4-BE49-F238E27FC236}">
-                <a16:creationId xmlns:a16="http://schemas.microsoft.com/office/drawing/2014/main" id="{BBEA6D1A-7BEE-D443-9695-FB4C23725F4D}"/>
-              </a:ext>
-            </a:extLst>
-          </p:cNvPr>
-          <p:cNvSpPr>
-            <a:spLocks noGrp="1"/>
-          </p:cNvSpPr>
-          <p:nvPr>
-            <p:ph idx="1"/>
-          </p:nvPr>
-        </p:nvSpPr>
-        <p:spPr>
-          <a:xfrm>
-            <a:off x="913795" y="2076450"/>
-            <a:ext cx="10353762" cy="4384508"/>
-          </a:xfrm>
-        </p:spPr>
-        <p:txBody>
-          <a:bodyPr>
-            <a:normAutofit/>
-          </a:bodyPr>
-          <a:lstStyle/>
-          <a:p>
-            <a:r>
-              <a:rPr lang="en-AU" dirty="0">
-                <a:latin typeface="Arial" panose="020B0604020202020204" pitchFamily="34" charset="0"/>
-                <a:cs typeface="Arial" panose="020B0604020202020204" pitchFamily="34" charset="0"/>
-              </a:rPr>
-              <a:t>Codes of Ethics are needed by all endeavours that are ”professions”. In cybersecurity, there are several organisations that have them</a:t>
-            </a:r>
-          </a:p>
-          <a:p>
-            <a:r>
-              <a:rPr lang="en-AU" dirty="0">
-                <a:latin typeface="Arial" panose="020B0604020202020204" pitchFamily="34" charset="0"/>
-                <a:cs typeface="Arial" panose="020B0604020202020204" pitchFamily="34" charset="0"/>
-              </a:rPr>
-              <a:t>ISC</a:t>
-            </a:r>
-            <a:r>
-              <a:rPr lang="en-AU" baseline="30000" dirty="0">
-                <a:latin typeface="Arial" panose="020B0604020202020204" pitchFamily="34" charset="0"/>
-                <a:cs typeface="Arial" panose="020B0604020202020204" pitchFamily="34" charset="0"/>
-              </a:rPr>
-              <a:t>2</a:t>
-            </a:r>
-            <a:endParaRPr lang="en-AU" baseline="30000" dirty="0">
-              <a:effectLst>
-                <a:outerShdw blurRad="38100" dist="38100" dir="2700000" algn="tl">
-                  <a:srgbClr val="000000">
-                    <a:alpha val="43137"/>
-                  </a:srgbClr>
-                </a:outerShdw>
-              </a:effectLst>
-              <a:latin typeface="Arial" panose="020B0604020202020204" pitchFamily="34" charset="0"/>
-              <a:cs typeface="Arial" panose="020B0604020202020204" pitchFamily="34" charset="0"/>
-            </a:endParaRPr>
-          </a:p>
-          <a:p>
-            <a:pPr lvl="1"/>
-            <a:r>
-              <a:rPr lang="en-AU" dirty="0">
-                <a:latin typeface="Arial" panose="020B0604020202020204" pitchFamily="34" charset="0"/>
-                <a:cs typeface="Arial" panose="020B0604020202020204" pitchFamily="34" charset="0"/>
-              </a:rPr>
-              <a:t>Protect society, the common good, necessary public trust and confidence, and the infrastructure. </a:t>
-            </a:r>
-          </a:p>
-          <a:p>
-            <a:pPr lvl="1"/>
-            <a:r>
-              <a:rPr lang="en-AU" dirty="0">
-                <a:latin typeface="Arial" panose="020B0604020202020204" pitchFamily="34" charset="0"/>
-                <a:cs typeface="Arial" panose="020B0604020202020204" pitchFamily="34" charset="0"/>
-              </a:rPr>
-              <a:t>Act honourably, honestly, justly, responsibly, and legally. </a:t>
-            </a:r>
-          </a:p>
-          <a:p>
-            <a:pPr lvl="1"/>
-            <a:r>
-              <a:rPr lang="en-AU" dirty="0">
-                <a:latin typeface="Arial" panose="020B0604020202020204" pitchFamily="34" charset="0"/>
-                <a:cs typeface="Arial" panose="020B0604020202020204" pitchFamily="34" charset="0"/>
-              </a:rPr>
-              <a:t>Provide diligent and competent service to principals. </a:t>
-            </a:r>
-          </a:p>
-          <a:p>
-            <a:pPr lvl="1"/>
-            <a:r>
-              <a:rPr lang="en-AU" dirty="0">
-                <a:latin typeface="Arial" panose="020B0604020202020204" pitchFamily="34" charset="0"/>
-                <a:cs typeface="Arial" panose="020B0604020202020204" pitchFamily="34" charset="0"/>
-              </a:rPr>
-              <a:t>Advance and protect the profession.</a:t>
-            </a:r>
-          </a:p>
-          <a:p>
-            <a:endParaRPr lang="en-AU" dirty="0">
-              <a:latin typeface="Arial" panose="020B0604020202020204" pitchFamily="34" charset="0"/>
-              <a:cs typeface="Arial" panose="020B0604020202020204" pitchFamily="34" charset="0"/>
-            </a:endParaRPr>
-          </a:p>
-        </p:txBody>
-      </p:sp>
-    </p:spTree>
-    <p:extLst>
-      <p:ext uri="{BB962C8B-B14F-4D97-AF65-F5344CB8AC3E}">
-        <p14:creationId xmlns:p14="http://schemas.microsoft.com/office/powerpoint/2010/main" val="2805807811"/>
-      </p:ext>
-    </p:extLst>
-  </p:cSld>
-  <p:clrMapOvr>
-    <a:masterClrMapping/>
-  </p:clrMapOvr>
-</p:sld>
-</file>
-
-<file path=ppt/slides/slide28.xml><?xml version="1.0" encoding="utf-8"?>
-<p:sld xmlns:a="http://schemas.openxmlformats.org/drawingml/2006/main" xmlns:r="http://schemas.openxmlformats.org/officeDocument/2006/relationships" xmlns:p="http://schemas.openxmlformats.org/presentationml/2006/main">
-  <p:cSld>
-    <p:spTree>
-      <p:nvGrpSpPr>
-        <p:cNvPr id="1" name=""/>
-        <p:cNvGrpSpPr/>
-        <p:nvPr/>
-      </p:nvGrpSpPr>
-      <p:grpSpPr>
-        <a:xfrm>
-          <a:off x="0" y="0"/>
-          <a:ext cx="0" cy="0"/>
-          <a:chOff x="0" y="0"/>
-          <a:chExt cx="0" cy="0"/>
-        </a:xfrm>
-      </p:grpSpPr>
-      <p:sp>
-        <p:nvSpPr>
-          <p:cNvPr id="2" name="Title 1">
-            <a:extLst>
-              <a:ext uri="{FF2B5EF4-FFF2-40B4-BE49-F238E27FC236}">
                 <a16:creationId xmlns:a16="http://schemas.microsoft.com/office/drawing/2014/main" id="{0AB97A6F-E7F5-304A-A25F-61E764525B5B}"/>
               </a:ext>
             </a:extLst>
@@ -17806,7 +17623,7 @@
 </p:sld>
 </file>
 
-<file path=ppt/slides/slide29.xml><?xml version="1.0" encoding="utf-8"?>
+<file path=ppt/slides/slide28.xml><?xml version="1.0" encoding="utf-8"?>
 <p:sld xmlns:a="http://schemas.openxmlformats.org/drawingml/2006/main" xmlns:r="http://schemas.openxmlformats.org/officeDocument/2006/relationships" xmlns:p="http://schemas.openxmlformats.org/presentationml/2006/main">
   <p:cSld>
     <p:spTree>
@@ -19459,7 +19276,7 @@
           <a:p>
             <a:r>
               <a:rPr lang="en-AU" dirty="0"/>
-              <a:t>Assessments</a:t>
+              <a:t>Unit Structure</a:t>
             </a:r>
           </a:p>
         </p:txBody>

</xml_diff>